<commit_message>
Tweaked ppt because of MLP architecture
</commit_message>
<xml_diff>
--- a/TeX/Presentation/InClassPresentation.pptx
+++ b/TeX/Presentation/InClassPresentation.pptx
@@ -12651,3792 +12651,6 @@
       </p:grpSpPr>
       <p:sp>
         <p:nvSpPr>
-          <p:cNvPr id="111" name="CustomShape 1"/>
-          <p:cNvSpPr/>
-          <p:nvPr/>
-        </p:nvSpPr>
-        <p:spPr>
-          <a:xfrm>
-            <a:off x="1529280" y="3100680"/>
-            <a:ext cx="990360" cy="2677680"/>
-          </a:xfrm>
-          <a:prstGeom prst="rect">
-            <a:avLst/>
-          </a:prstGeom>
-          <a:solidFill>
-            <a:schemeClr val="bg1">
-              <a:lumMod val="95000"/>
-            </a:schemeClr>
-          </a:solidFill>
-          <a:ln>
-            <a:noFill/>
-          </a:ln>
-          <a:effectLst>
-            <a:outerShdw blurRad="50800" dist="38100" dir="8100000" algn="tr" rotWithShape="0">
-              <a:srgbClr val="000000">
-                <a:alpha val="40000"/>
-              </a:srgbClr>
-            </a:outerShdw>
-            <a:softEdge rad="12700"/>
-          </a:effectLst>
-        </p:spPr>
-        <p:style>
-          <a:lnRef idx="2">
-            <a:schemeClr val="accent1">
-              <a:shade val="50000"/>
-            </a:schemeClr>
-          </a:lnRef>
-          <a:fillRef idx="1">
-            <a:schemeClr val="accent1"/>
-          </a:fillRef>
-          <a:effectRef idx="0">
-            <a:schemeClr val="accent1"/>
-          </a:effectRef>
-          <a:fontRef idx="minor"/>
-        </p:style>
-      </p:sp>
-      <p:sp>
-        <p:nvSpPr>
-          <p:cNvPr id="112" name="CustomShape 2"/>
-          <p:cNvSpPr/>
-          <p:nvPr/>
-        </p:nvSpPr>
-        <p:spPr>
-          <a:xfrm>
-            <a:off x="1529280" y="3100680"/>
-            <a:ext cx="990360" cy="2677680"/>
-          </a:xfrm>
-          <a:prstGeom prst="rect">
-            <a:avLst/>
-          </a:prstGeom>
-          <a:blipFill>
-            <a:blip r:embed="rId2"/>
-            <a:stretch>
-              <a:fillRect/>
-            </a:stretch>
-          </a:blipFill>
-          <a:ln>
-            <a:noFill/>
-          </a:ln>
-          <a:effectLst>
-            <a:outerShdw blurRad="50800" dist="38100" dir="8100000" algn="tr" rotWithShape="0">
-              <a:srgbClr val="000000">
-                <a:alpha val="40000"/>
-              </a:srgbClr>
-            </a:outerShdw>
-            <a:softEdge rad="12700"/>
-          </a:effectLst>
-        </p:spPr>
-        <p:style>
-          <a:lnRef idx="0">
-            <a:scrgbClr r="0" g="0" b="0"/>
-          </a:lnRef>
-          <a:fillRef idx="0">
-            <a:scrgbClr r="0" g="0" b="0"/>
-          </a:fillRef>
-          <a:effectRef idx="0">
-            <a:scrgbClr r="0" g="0" b="0"/>
-          </a:effectRef>
-          <a:fontRef idx="minor"/>
-        </p:style>
-        <p:txBody>
-          <a:bodyPr lIns="90000" tIns="45000" rIns="90000" bIns="45000"/>
-          <a:lstStyle/>
-          <a:p>
-            <a:pPr>
-              <a:lnSpc>
-                <a:spcPct val="100000"/>
-              </a:lnSpc>
-            </a:pPr>
-            <a:r>
-              <a:rPr lang="en-US" sz="1800" b="0" strike="noStrike" spc="-1">
-                <a:solidFill>
-                  <a:srgbClr val="000000"/>
-                </a:solidFill>
-                <a:uFill>
-                  <a:solidFill>
-                    <a:srgbClr val="FFFFFF"/>
-                  </a:solidFill>
-                </a:uFill>
-                <a:latin typeface="Arial"/>
-              </a:rPr>
-              <a:t> </a:t>
-            </a:r>
-          </a:p>
-        </p:txBody>
-      </p:sp>
-      <p:sp>
-        <p:nvSpPr>
-          <p:cNvPr id="113" name="CustomShape 3"/>
-          <p:cNvSpPr/>
-          <p:nvPr/>
-        </p:nvSpPr>
-        <p:spPr>
-          <a:xfrm>
-            <a:off x="1504440" y="5764680"/>
-            <a:ext cx="1040760" cy="364680"/>
-          </a:xfrm>
-          <a:prstGeom prst="rect">
-            <a:avLst/>
-          </a:prstGeom>
-          <a:noFill/>
-          <a:ln>
-            <a:noFill/>
-          </a:ln>
-        </p:spPr>
-        <p:style>
-          <a:lnRef idx="0">
-            <a:scrgbClr r="0" g="0" b="0"/>
-          </a:lnRef>
-          <a:fillRef idx="0">
-            <a:scrgbClr r="0" g="0" b="0"/>
-          </a:fillRef>
-          <a:effectRef idx="0">
-            <a:scrgbClr r="0" g="0" b="0"/>
-          </a:effectRef>
-          <a:fontRef idx="minor"/>
-        </p:style>
-        <p:txBody>
-          <a:bodyPr wrap="none" lIns="90000" tIns="45000" rIns="90000" bIns="45000"/>
-          <a:lstStyle/>
-          <a:p>
-            <a:pPr>
-              <a:lnSpc>
-                <a:spcPct val="100000"/>
-              </a:lnSpc>
-            </a:pPr>
-            <a:r>
-              <a:rPr lang="en-US" sz="1800" b="0" strike="noStrike" spc="-1">
-                <a:solidFill>
-                  <a:srgbClr val="000000"/>
-                </a:solidFill>
-                <a:uFill>
-                  <a:solidFill>
-                    <a:srgbClr val="FFFFFF"/>
-                  </a:solidFill>
-                </a:uFill>
-                <a:latin typeface="Cambria Math"/>
-                <a:ea typeface="Cambria Math"/>
-              </a:rPr>
-              <a:t>300 x 1</a:t>
-            </a:r>
-            <a:endParaRPr lang="en-US" sz="1800" b="0" strike="noStrike" spc="-1">
-              <a:solidFill>
-                <a:srgbClr val="000000"/>
-              </a:solidFill>
-              <a:uFill>
-                <a:solidFill>
-                  <a:srgbClr val="FFFFFF"/>
-                </a:solidFill>
-              </a:uFill>
-              <a:latin typeface="Arial"/>
-            </a:endParaRPr>
-          </a:p>
-        </p:txBody>
-      </p:sp>
-      <p:sp>
-        <p:nvSpPr>
-          <p:cNvPr id="114" name="CustomShape 4"/>
-          <p:cNvSpPr/>
-          <p:nvPr/>
-        </p:nvSpPr>
-        <p:spPr>
-          <a:xfrm>
-            <a:off x="3369240" y="3100680"/>
-            <a:ext cx="990360" cy="2677680"/>
-          </a:xfrm>
-          <a:prstGeom prst="rect">
-            <a:avLst/>
-          </a:prstGeom>
-          <a:solidFill>
-            <a:schemeClr val="bg1">
-              <a:lumMod val="95000"/>
-            </a:schemeClr>
-          </a:solidFill>
-          <a:ln>
-            <a:noFill/>
-          </a:ln>
-          <a:effectLst>
-            <a:outerShdw blurRad="50800" dist="38100" dir="8100000" algn="tr" rotWithShape="0">
-              <a:srgbClr val="000000">
-                <a:alpha val="40000"/>
-              </a:srgbClr>
-            </a:outerShdw>
-            <a:softEdge rad="12700"/>
-          </a:effectLst>
-        </p:spPr>
-        <p:style>
-          <a:lnRef idx="2">
-            <a:schemeClr val="accent1">
-              <a:shade val="50000"/>
-            </a:schemeClr>
-          </a:lnRef>
-          <a:fillRef idx="1">
-            <a:schemeClr val="accent1"/>
-          </a:fillRef>
-          <a:effectRef idx="0">
-            <a:schemeClr val="accent1"/>
-          </a:effectRef>
-          <a:fontRef idx="minor"/>
-        </p:style>
-      </p:sp>
-      <p:sp>
-        <p:nvSpPr>
-          <p:cNvPr id="115" name="CustomShape 5"/>
-          <p:cNvSpPr/>
-          <p:nvPr/>
-        </p:nvSpPr>
-        <p:spPr>
-          <a:xfrm>
-            <a:off x="6825240" y="3100680"/>
-            <a:ext cx="990360" cy="2677680"/>
-          </a:xfrm>
-          <a:prstGeom prst="rect">
-            <a:avLst/>
-          </a:prstGeom>
-          <a:solidFill>
-            <a:schemeClr val="bg1">
-              <a:lumMod val="95000"/>
-            </a:schemeClr>
-          </a:solidFill>
-          <a:ln>
-            <a:noFill/>
-          </a:ln>
-          <a:effectLst>
-            <a:outerShdw blurRad="50800" dist="38100" dir="8100000" algn="tr" rotWithShape="0">
-              <a:srgbClr val="000000">
-                <a:alpha val="40000"/>
-              </a:srgbClr>
-            </a:outerShdw>
-            <a:softEdge rad="12700"/>
-          </a:effectLst>
-        </p:spPr>
-        <p:style>
-          <a:lnRef idx="2">
-            <a:schemeClr val="accent1">
-              <a:shade val="50000"/>
-            </a:schemeClr>
-          </a:lnRef>
-          <a:fillRef idx="1">
-            <a:schemeClr val="accent1"/>
-          </a:fillRef>
-          <a:effectRef idx="0">
-            <a:schemeClr val="accent1"/>
-          </a:effectRef>
-          <a:fontRef idx="minor"/>
-        </p:style>
-      </p:sp>
-      <p:sp>
-        <p:nvSpPr>
-          <p:cNvPr id="116" name="CustomShape 6"/>
-          <p:cNvSpPr/>
-          <p:nvPr/>
-        </p:nvSpPr>
-        <p:spPr>
-          <a:xfrm>
-            <a:off x="9144360" y="3399840"/>
-            <a:ext cx="990360" cy="2078640"/>
-          </a:xfrm>
-          <a:prstGeom prst="rect">
-            <a:avLst/>
-          </a:prstGeom>
-          <a:solidFill>
-            <a:schemeClr val="bg1">
-              <a:lumMod val="95000"/>
-            </a:schemeClr>
-          </a:solidFill>
-          <a:ln>
-            <a:noFill/>
-          </a:ln>
-          <a:effectLst>
-            <a:outerShdw blurRad="50800" dist="38100" dir="8100000" algn="tr" rotWithShape="0">
-              <a:srgbClr val="000000">
-                <a:alpha val="40000"/>
-              </a:srgbClr>
-            </a:outerShdw>
-            <a:softEdge rad="12700"/>
-          </a:effectLst>
-        </p:spPr>
-        <p:style>
-          <a:lnRef idx="2">
-            <a:schemeClr val="accent1">
-              <a:shade val="50000"/>
-            </a:schemeClr>
-          </a:lnRef>
-          <a:fillRef idx="1">
-            <a:schemeClr val="accent1"/>
-          </a:fillRef>
-          <a:effectRef idx="0">
-            <a:schemeClr val="accent1"/>
-          </a:effectRef>
-          <a:fontRef idx="minor"/>
-        </p:style>
-      </p:sp>
-      <p:sp>
-        <p:nvSpPr>
-          <p:cNvPr id="117" name="CustomShape 7"/>
-          <p:cNvSpPr/>
-          <p:nvPr/>
-        </p:nvSpPr>
-        <p:spPr>
-          <a:xfrm>
-            <a:off x="9144360" y="3399840"/>
-            <a:ext cx="990360" cy="2078640"/>
-          </a:xfrm>
-          <a:prstGeom prst="rect">
-            <a:avLst/>
-          </a:prstGeom>
-          <a:blipFill>
-            <a:blip r:embed="rId3"/>
-            <a:stretch>
-              <a:fillRect/>
-            </a:stretch>
-          </a:blipFill>
-          <a:ln>
-            <a:noFill/>
-          </a:ln>
-          <a:effectLst>
-            <a:outerShdw blurRad="50800" dist="38100" dir="8100000" algn="tr" rotWithShape="0">
-              <a:srgbClr val="000000">
-                <a:alpha val="40000"/>
-              </a:srgbClr>
-            </a:outerShdw>
-            <a:softEdge rad="12700"/>
-          </a:effectLst>
-        </p:spPr>
-        <p:style>
-          <a:lnRef idx="0">
-            <a:scrgbClr r="0" g="0" b="0"/>
-          </a:lnRef>
-          <a:fillRef idx="0">
-            <a:scrgbClr r="0" g="0" b="0"/>
-          </a:fillRef>
-          <a:effectRef idx="0">
-            <a:scrgbClr r="0" g="0" b="0"/>
-          </a:effectRef>
-          <a:fontRef idx="minor"/>
-        </p:style>
-        <p:txBody>
-          <a:bodyPr lIns="90000" tIns="45000" rIns="90000" bIns="45000"/>
-          <a:lstStyle/>
-          <a:p>
-            <a:pPr>
-              <a:lnSpc>
-                <a:spcPct val="100000"/>
-              </a:lnSpc>
-            </a:pPr>
-            <a:r>
-              <a:rPr lang="en-US" sz="1800" b="0" strike="noStrike" spc="-1">
-                <a:solidFill>
-                  <a:srgbClr val="000000"/>
-                </a:solidFill>
-                <a:uFill>
-                  <a:solidFill>
-                    <a:srgbClr val="FFFFFF"/>
-                  </a:solidFill>
-                </a:uFill>
-                <a:latin typeface="Arial"/>
-              </a:rPr>
-              <a:t> </a:t>
-            </a:r>
-          </a:p>
-        </p:txBody>
-      </p:sp>
-      <p:sp>
-        <p:nvSpPr>
-          <p:cNvPr id="118" name="CustomShape 8"/>
-          <p:cNvSpPr/>
-          <p:nvPr/>
-        </p:nvSpPr>
-        <p:spPr>
-          <a:xfrm>
-            <a:off x="2520000" y="4439520"/>
-            <a:ext cx="848880" cy="360"/>
-          </a:xfrm>
-          <a:custGeom>
-            <a:avLst/>
-            <a:gdLst/>
-            <a:ahLst/>
-            <a:cxnLst/>
-            <a:rect l="l" t="t" r="r" b="b"/>
-            <a:pathLst>
-              <a:path w="21600" h="21600">
-                <a:moveTo>
-                  <a:pt x="0" y="0"/>
-                </a:moveTo>
-                <a:lnTo>
-                  <a:pt x="21600" y="21600"/>
-                </a:lnTo>
-              </a:path>
-            </a:pathLst>
-          </a:custGeom>
-          <a:noFill/>
-          <a:ln w="28440">
-            <a:solidFill>
-              <a:srgbClr val="833AA6"/>
-            </a:solidFill>
-            <a:round/>
-            <a:tailEnd type="arrow" w="med" len="med"/>
-          </a:ln>
-        </p:spPr>
-        <p:style>
-          <a:lnRef idx="1">
-            <a:schemeClr val="accent1"/>
-          </a:lnRef>
-          <a:fillRef idx="0">
-            <a:schemeClr val="accent1"/>
-          </a:fillRef>
-          <a:effectRef idx="0">
-            <a:schemeClr val="accent1"/>
-          </a:effectRef>
-          <a:fontRef idx="minor"/>
-        </p:style>
-      </p:sp>
-      <p:sp>
-        <p:nvSpPr>
-          <p:cNvPr id="119" name="CustomShape 9"/>
-          <p:cNvSpPr/>
-          <p:nvPr/>
-        </p:nvSpPr>
-        <p:spPr>
-          <a:xfrm>
-            <a:off x="2520000" y="3508920"/>
-            <a:ext cx="848880" cy="360"/>
-          </a:xfrm>
-          <a:custGeom>
-            <a:avLst/>
-            <a:gdLst/>
-            <a:ahLst/>
-            <a:cxnLst/>
-            <a:rect l="l" t="t" r="r" b="b"/>
-            <a:pathLst>
-              <a:path w="21600" h="21600">
-                <a:moveTo>
-                  <a:pt x="0" y="0"/>
-                </a:moveTo>
-                <a:lnTo>
-                  <a:pt x="21600" y="21600"/>
-                </a:lnTo>
-              </a:path>
-            </a:pathLst>
-          </a:custGeom>
-          <a:noFill/>
-          <a:ln w="28440">
-            <a:solidFill>
-              <a:srgbClr val="833AA6"/>
-            </a:solidFill>
-            <a:round/>
-            <a:tailEnd type="arrow" w="med" len="med"/>
-          </a:ln>
-        </p:spPr>
-        <p:style>
-          <a:lnRef idx="1">
-            <a:schemeClr val="accent1"/>
-          </a:lnRef>
-          <a:fillRef idx="0">
-            <a:schemeClr val="accent1"/>
-          </a:fillRef>
-          <a:effectRef idx="0">
-            <a:schemeClr val="accent1"/>
-          </a:effectRef>
-          <a:fontRef idx="minor"/>
-        </p:style>
-      </p:sp>
-      <p:sp>
-        <p:nvSpPr>
-          <p:cNvPr id="120" name="CustomShape 10"/>
-          <p:cNvSpPr/>
-          <p:nvPr/>
-        </p:nvSpPr>
-        <p:spPr>
-          <a:xfrm>
-            <a:off x="2520000" y="3508920"/>
-            <a:ext cx="848880" cy="280440"/>
-          </a:xfrm>
-          <a:custGeom>
-            <a:avLst/>
-            <a:gdLst/>
-            <a:ahLst/>
-            <a:cxnLst/>
-            <a:rect l="l" t="t" r="r" b="b"/>
-            <a:pathLst>
-              <a:path w="21600" h="21600">
-                <a:moveTo>
-                  <a:pt x="0" y="0"/>
-                </a:moveTo>
-                <a:lnTo>
-                  <a:pt x="21600" y="21600"/>
-                </a:lnTo>
-              </a:path>
-            </a:pathLst>
-          </a:custGeom>
-          <a:noFill/>
-          <a:ln w="28440">
-            <a:solidFill>
-              <a:srgbClr val="833AA6"/>
-            </a:solidFill>
-            <a:round/>
-            <a:tailEnd type="arrow" w="med" len="med"/>
-          </a:ln>
-        </p:spPr>
-        <p:style>
-          <a:lnRef idx="1">
-            <a:schemeClr val="accent1"/>
-          </a:lnRef>
-          <a:fillRef idx="0">
-            <a:schemeClr val="accent1"/>
-          </a:fillRef>
-          <a:effectRef idx="0">
-            <a:schemeClr val="accent1"/>
-          </a:effectRef>
-          <a:fontRef idx="minor"/>
-        </p:style>
-      </p:sp>
-      <p:sp>
-        <p:nvSpPr>
-          <p:cNvPr id="121" name="CustomShape 11"/>
-          <p:cNvSpPr/>
-          <p:nvPr/>
-        </p:nvSpPr>
-        <p:spPr>
-          <a:xfrm flipV="1">
-            <a:off x="2520000" y="3229200"/>
-            <a:ext cx="848880" cy="280440"/>
-          </a:xfrm>
-          <a:custGeom>
-            <a:avLst/>
-            <a:gdLst/>
-            <a:ahLst/>
-            <a:cxnLst/>
-            <a:rect l="l" t="t" r="r" b="b"/>
-            <a:pathLst>
-              <a:path w="21600" h="21600">
-                <a:moveTo>
-                  <a:pt x="0" y="0"/>
-                </a:moveTo>
-                <a:lnTo>
-                  <a:pt x="21600" y="21600"/>
-                </a:lnTo>
-              </a:path>
-            </a:pathLst>
-          </a:custGeom>
-          <a:noFill/>
-          <a:ln w="28440">
-            <a:solidFill>
-              <a:srgbClr val="833AA6"/>
-            </a:solidFill>
-            <a:round/>
-            <a:tailEnd type="arrow" w="med" len="med"/>
-          </a:ln>
-        </p:spPr>
-        <p:style>
-          <a:lnRef idx="1">
-            <a:schemeClr val="accent1"/>
-          </a:lnRef>
-          <a:fillRef idx="0">
-            <a:schemeClr val="accent1"/>
-          </a:fillRef>
-          <a:effectRef idx="0">
-            <a:schemeClr val="accent1"/>
-          </a:effectRef>
-          <a:fontRef idx="minor"/>
-        </p:style>
-      </p:sp>
-      <p:sp>
-        <p:nvSpPr>
-          <p:cNvPr id="122" name="CustomShape 12"/>
-          <p:cNvSpPr/>
-          <p:nvPr/>
-        </p:nvSpPr>
-        <p:spPr>
-          <a:xfrm>
-            <a:off x="2520000" y="4439520"/>
-            <a:ext cx="848880" cy="360"/>
-          </a:xfrm>
-          <a:custGeom>
-            <a:avLst/>
-            <a:gdLst/>
-            <a:ahLst/>
-            <a:cxnLst/>
-            <a:rect l="l" t="t" r="r" b="b"/>
-            <a:pathLst>
-              <a:path w="21600" h="21600">
-                <a:moveTo>
-                  <a:pt x="0" y="0"/>
-                </a:moveTo>
-                <a:lnTo>
-                  <a:pt x="21600" y="21600"/>
-                </a:lnTo>
-              </a:path>
-            </a:pathLst>
-          </a:custGeom>
-          <a:noFill/>
-          <a:ln w="28440">
-            <a:solidFill>
-              <a:srgbClr val="833AA6"/>
-            </a:solidFill>
-            <a:round/>
-            <a:tailEnd type="arrow" w="med" len="med"/>
-          </a:ln>
-        </p:spPr>
-        <p:style>
-          <a:lnRef idx="1">
-            <a:schemeClr val="accent1"/>
-          </a:lnRef>
-          <a:fillRef idx="0">
-            <a:schemeClr val="accent1"/>
-          </a:fillRef>
-          <a:effectRef idx="0">
-            <a:schemeClr val="accent1"/>
-          </a:effectRef>
-          <a:fontRef idx="minor"/>
-        </p:style>
-      </p:sp>
-      <p:sp>
-        <p:nvSpPr>
-          <p:cNvPr id="123" name="CustomShape 13"/>
-          <p:cNvSpPr/>
-          <p:nvPr/>
-        </p:nvSpPr>
-        <p:spPr>
-          <a:xfrm>
-            <a:off x="2520000" y="4439520"/>
-            <a:ext cx="848880" cy="280440"/>
-          </a:xfrm>
-          <a:custGeom>
-            <a:avLst/>
-            <a:gdLst/>
-            <a:ahLst/>
-            <a:cxnLst/>
-            <a:rect l="l" t="t" r="r" b="b"/>
-            <a:pathLst>
-              <a:path w="21600" h="21600">
-                <a:moveTo>
-                  <a:pt x="0" y="0"/>
-                </a:moveTo>
-                <a:lnTo>
-                  <a:pt x="21600" y="21600"/>
-                </a:lnTo>
-              </a:path>
-            </a:pathLst>
-          </a:custGeom>
-          <a:noFill/>
-          <a:ln w="28440">
-            <a:solidFill>
-              <a:srgbClr val="833AA6"/>
-            </a:solidFill>
-            <a:round/>
-            <a:tailEnd type="arrow" w="med" len="med"/>
-          </a:ln>
-        </p:spPr>
-        <p:style>
-          <a:lnRef idx="1">
-            <a:schemeClr val="accent1"/>
-          </a:lnRef>
-          <a:fillRef idx="0">
-            <a:schemeClr val="accent1"/>
-          </a:fillRef>
-          <a:effectRef idx="0">
-            <a:schemeClr val="accent1"/>
-          </a:effectRef>
-          <a:fontRef idx="minor"/>
-        </p:style>
-      </p:sp>
-      <p:sp>
-        <p:nvSpPr>
-          <p:cNvPr id="124" name="CustomShape 14"/>
-          <p:cNvSpPr/>
-          <p:nvPr/>
-        </p:nvSpPr>
-        <p:spPr>
-          <a:xfrm flipV="1">
-            <a:off x="2520000" y="4159800"/>
-            <a:ext cx="848880" cy="280440"/>
-          </a:xfrm>
-          <a:custGeom>
-            <a:avLst/>
-            <a:gdLst/>
-            <a:ahLst/>
-            <a:cxnLst/>
-            <a:rect l="l" t="t" r="r" b="b"/>
-            <a:pathLst>
-              <a:path w="21600" h="21600">
-                <a:moveTo>
-                  <a:pt x="0" y="0"/>
-                </a:moveTo>
-                <a:lnTo>
-                  <a:pt x="21600" y="21600"/>
-                </a:lnTo>
-              </a:path>
-            </a:pathLst>
-          </a:custGeom>
-          <a:noFill/>
-          <a:ln w="28440">
-            <a:solidFill>
-              <a:srgbClr val="833AA6"/>
-            </a:solidFill>
-            <a:round/>
-            <a:tailEnd type="arrow" w="med" len="med"/>
-          </a:ln>
-        </p:spPr>
-        <p:style>
-          <a:lnRef idx="1">
-            <a:schemeClr val="accent1"/>
-          </a:lnRef>
-          <a:fillRef idx="0">
-            <a:schemeClr val="accent1"/>
-          </a:fillRef>
-          <a:effectRef idx="0">
-            <a:schemeClr val="accent1"/>
-          </a:effectRef>
-          <a:fontRef idx="minor"/>
-        </p:style>
-      </p:sp>
-      <p:sp>
-        <p:nvSpPr>
-          <p:cNvPr id="125" name="CustomShape 15"/>
-          <p:cNvSpPr/>
-          <p:nvPr/>
-        </p:nvSpPr>
-        <p:spPr>
-          <a:xfrm>
-            <a:off x="2520000" y="5371560"/>
-            <a:ext cx="848880" cy="360"/>
-          </a:xfrm>
-          <a:custGeom>
-            <a:avLst/>
-            <a:gdLst/>
-            <a:ahLst/>
-            <a:cxnLst/>
-            <a:rect l="l" t="t" r="r" b="b"/>
-            <a:pathLst>
-              <a:path w="21600" h="21600">
-                <a:moveTo>
-                  <a:pt x="0" y="0"/>
-                </a:moveTo>
-                <a:lnTo>
-                  <a:pt x="21600" y="21600"/>
-                </a:lnTo>
-              </a:path>
-            </a:pathLst>
-          </a:custGeom>
-          <a:noFill/>
-          <a:ln w="28440">
-            <a:solidFill>
-              <a:srgbClr val="833AA6"/>
-            </a:solidFill>
-            <a:round/>
-            <a:tailEnd type="arrow" w="med" len="med"/>
-          </a:ln>
-        </p:spPr>
-        <p:style>
-          <a:lnRef idx="1">
-            <a:schemeClr val="accent1"/>
-          </a:lnRef>
-          <a:fillRef idx="0">
-            <a:schemeClr val="accent1"/>
-          </a:fillRef>
-          <a:effectRef idx="0">
-            <a:schemeClr val="accent1"/>
-          </a:effectRef>
-          <a:fontRef idx="minor"/>
-        </p:style>
-      </p:sp>
-      <p:sp>
-        <p:nvSpPr>
-          <p:cNvPr id="126" name="CustomShape 16"/>
-          <p:cNvSpPr/>
-          <p:nvPr/>
-        </p:nvSpPr>
-        <p:spPr>
-          <a:xfrm>
-            <a:off x="2520000" y="5371560"/>
-            <a:ext cx="848880" cy="280440"/>
-          </a:xfrm>
-          <a:custGeom>
-            <a:avLst/>
-            <a:gdLst/>
-            <a:ahLst/>
-            <a:cxnLst/>
-            <a:rect l="l" t="t" r="r" b="b"/>
-            <a:pathLst>
-              <a:path w="21600" h="21600">
-                <a:moveTo>
-                  <a:pt x="0" y="0"/>
-                </a:moveTo>
-                <a:lnTo>
-                  <a:pt x="21600" y="21600"/>
-                </a:lnTo>
-              </a:path>
-            </a:pathLst>
-          </a:custGeom>
-          <a:noFill/>
-          <a:ln w="28440">
-            <a:solidFill>
-              <a:srgbClr val="833AA6"/>
-            </a:solidFill>
-            <a:round/>
-            <a:tailEnd type="arrow" w="med" len="med"/>
-          </a:ln>
-        </p:spPr>
-        <p:style>
-          <a:lnRef idx="1">
-            <a:schemeClr val="accent1"/>
-          </a:lnRef>
-          <a:fillRef idx="0">
-            <a:schemeClr val="accent1"/>
-          </a:fillRef>
-          <a:effectRef idx="0">
-            <a:schemeClr val="accent1"/>
-          </a:effectRef>
-          <a:fontRef idx="minor"/>
-        </p:style>
-      </p:sp>
-      <p:sp>
-        <p:nvSpPr>
-          <p:cNvPr id="127" name="CustomShape 17"/>
-          <p:cNvSpPr/>
-          <p:nvPr/>
-        </p:nvSpPr>
-        <p:spPr>
-          <a:xfrm flipV="1">
-            <a:off x="2520000" y="5092200"/>
-            <a:ext cx="848880" cy="280440"/>
-          </a:xfrm>
-          <a:custGeom>
-            <a:avLst/>
-            <a:gdLst/>
-            <a:ahLst/>
-            <a:cxnLst/>
-            <a:rect l="l" t="t" r="r" b="b"/>
-            <a:pathLst>
-              <a:path w="21600" h="21600">
-                <a:moveTo>
-                  <a:pt x="0" y="0"/>
-                </a:moveTo>
-                <a:lnTo>
-                  <a:pt x="21600" y="21600"/>
-                </a:lnTo>
-              </a:path>
-            </a:pathLst>
-          </a:custGeom>
-          <a:noFill/>
-          <a:ln w="28440">
-            <a:solidFill>
-              <a:srgbClr val="833AA6"/>
-            </a:solidFill>
-            <a:round/>
-            <a:tailEnd type="arrow" w="med" len="med"/>
-          </a:ln>
-        </p:spPr>
-        <p:style>
-          <a:lnRef idx="1">
-            <a:schemeClr val="accent1"/>
-          </a:lnRef>
-          <a:fillRef idx="0">
-            <a:schemeClr val="accent1"/>
-          </a:fillRef>
-          <a:effectRef idx="0">
-            <a:schemeClr val="accent1"/>
-          </a:effectRef>
-          <a:fontRef idx="minor"/>
-        </p:style>
-      </p:sp>
-      <p:sp>
-        <p:nvSpPr>
-          <p:cNvPr id="128" name="CustomShape 18"/>
-          <p:cNvSpPr/>
-          <p:nvPr/>
-        </p:nvSpPr>
-        <p:spPr>
-          <a:xfrm>
-            <a:off x="4717440" y="4439520"/>
-            <a:ext cx="848880" cy="360"/>
-          </a:xfrm>
-          <a:custGeom>
-            <a:avLst/>
-            <a:gdLst/>
-            <a:ahLst/>
-            <a:cxnLst/>
-            <a:rect l="l" t="t" r="r" b="b"/>
-            <a:pathLst>
-              <a:path w="21600" h="21600">
-                <a:moveTo>
-                  <a:pt x="0" y="0"/>
-                </a:moveTo>
-                <a:lnTo>
-                  <a:pt x="21600" y="21600"/>
-                </a:lnTo>
-              </a:path>
-            </a:pathLst>
-          </a:custGeom>
-          <a:noFill/>
-          <a:ln w="28440">
-            <a:solidFill>
-              <a:srgbClr val="833AA6"/>
-            </a:solidFill>
-            <a:round/>
-            <a:tailEnd type="arrow" w="med" len="med"/>
-          </a:ln>
-        </p:spPr>
-        <p:style>
-          <a:lnRef idx="1">
-            <a:schemeClr val="accent1"/>
-          </a:lnRef>
-          <a:fillRef idx="0">
-            <a:schemeClr val="accent1"/>
-          </a:fillRef>
-          <a:effectRef idx="0">
-            <a:schemeClr val="accent1"/>
-          </a:effectRef>
-          <a:fontRef idx="minor"/>
-        </p:style>
-      </p:sp>
-      <p:sp>
-        <p:nvSpPr>
-          <p:cNvPr id="129" name="CustomShape 19"/>
-          <p:cNvSpPr/>
-          <p:nvPr/>
-        </p:nvSpPr>
-        <p:spPr>
-          <a:xfrm>
-            <a:off x="4717440" y="3508920"/>
-            <a:ext cx="848880" cy="360"/>
-          </a:xfrm>
-          <a:custGeom>
-            <a:avLst/>
-            <a:gdLst/>
-            <a:ahLst/>
-            <a:cxnLst/>
-            <a:rect l="l" t="t" r="r" b="b"/>
-            <a:pathLst>
-              <a:path w="21600" h="21600">
-                <a:moveTo>
-                  <a:pt x="0" y="0"/>
-                </a:moveTo>
-                <a:lnTo>
-                  <a:pt x="21600" y="21600"/>
-                </a:lnTo>
-              </a:path>
-            </a:pathLst>
-          </a:custGeom>
-          <a:noFill/>
-          <a:ln w="28440">
-            <a:solidFill>
-              <a:srgbClr val="833AA6"/>
-            </a:solidFill>
-            <a:round/>
-            <a:tailEnd type="arrow" w="med" len="med"/>
-          </a:ln>
-        </p:spPr>
-        <p:style>
-          <a:lnRef idx="1">
-            <a:schemeClr val="accent1"/>
-          </a:lnRef>
-          <a:fillRef idx="0">
-            <a:schemeClr val="accent1"/>
-          </a:fillRef>
-          <a:effectRef idx="0">
-            <a:schemeClr val="accent1"/>
-          </a:effectRef>
-          <a:fontRef idx="minor"/>
-        </p:style>
-      </p:sp>
-      <p:sp>
-        <p:nvSpPr>
-          <p:cNvPr id="130" name="CustomShape 20"/>
-          <p:cNvSpPr/>
-          <p:nvPr/>
-        </p:nvSpPr>
-        <p:spPr>
-          <a:xfrm>
-            <a:off x="4717440" y="3508920"/>
-            <a:ext cx="848880" cy="280440"/>
-          </a:xfrm>
-          <a:custGeom>
-            <a:avLst/>
-            <a:gdLst/>
-            <a:ahLst/>
-            <a:cxnLst/>
-            <a:rect l="l" t="t" r="r" b="b"/>
-            <a:pathLst>
-              <a:path w="21600" h="21600">
-                <a:moveTo>
-                  <a:pt x="0" y="0"/>
-                </a:moveTo>
-                <a:lnTo>
-                  <a:pt x="21600" y="21600"/>
-                </a:lnTo>
-              </a:path>
-            </a:pathLst>
-          </a:custGeom>
-          <a:noFill/>
-          <a:ln w="28440">
-            <a:solidFill>
-              <a:srgbClr val="833AA6"/>
-            </a:solidFill>
-            <a:round/>
-            <a:tailEnd type="arrow" w="med" len="med"/>
-          </a:ln>
-        </p:spPr>
-        <p:style>
-          <a:lnRef idx="1">
-            <a:schemeClr val="accent1"/>
-          </a:lnRef>
-          <a:fillRef idx="0">
-            <a:schemeClr val="accent1"/>
-          </a:fillRef>
-          <a:effectRef idx="0">
-            <a:schemeClr val="accent1"/>
-          </a:effectRef>
-          <a:fontRef idx="minor"/>
-        </p:style>
-      </p:sp>
-      <p:sp>
-        <p:nvSpPr>
-          <p:cNvPr id="131" name="CustomShape 21"/>
-          <p:cNvSpPr/>
-          <p:nvPr/>
-        </p:nvSpPr>
-        <p:spPr>
-          <a:xfrm flipV="1">
-            <a:off x="4717440" y="3229200"/>
-            <a:ext cx="848880" cy="280440"/>
-          </a:xfrm>
-          <a:custGeom>
-            <a:avLst/>
-            <a:gdLst/>
-            <a:ahLst/>
-            <a:cxnLst/>
-            <a:rect l="l" t="t" r="r" b="b"/>
-            <a:pathLst>
-              <a:path w="21600" h="21600">
-                <a:moveTo>
-                  <a:pt x="0" y="0"/>
-                </a:moveTo>
-                <a:lnTo>
-                  <a:pt x="21600" y="21600"/>
-                </a:lnTo>
-              </a:path>
-            </a:pathLst>
-          </a:custGeom>
-          <a:noFill/>
-          <a:ln w="28440">
-            <a:solidFill>
-              <a:srgbClr val="833AA6"/>
-            </a:solidFill>
-            <a:round/>
-            <a:tailEnd type="arrow" w="med" len="med"/>
-          </a:ln>
-        </p:spPr>
-        <p:style>
-          <a:lnRef idx="1">
-            <a:schemeClr val="accent1"/>
-          </a:lnRef>
-          <a:fillRef idx="0">
-            <a:schemeClr val="accent1"/>
-          </a:fillRef>
-          <a:effectRef idx="0">
-            <a:schemeClr val="accent1"/>
-          </a:effectRef>
-          <a:fontRef idx="minor"/>
-        </p:style>
-      </p:sp>
-      <p:sp>
-        <p:nvSpPr>
-          <p:cNvPr id="132" name="CustomShape 22"/>
-          <p:cNvSpPr/>
-          <p:nvPr/>
-        </p:nvSpPr>
-        <p:spPr>
-          <a:xfrm>
-            <a:off x="4717440" y="4439520"/>
-            <a:ext cx="848880" cy="360"/>
-          </a:xfrm>
-          <a:custGeom>
-            <a:avLst/>
-            <a:gdLst/>
-            <a:ahLst/>
-            <a:cxnLst/>
-            <a:rect l="l" t="t" r="r" b="b"/>
-            <a:pathLst>
-              <a:path w="21600" h="21600">
-                <a:moveTo>
-                  <a:pt x="0" y="0"/>
-                </a:moveTo>
-                <a:lnTo>
-                  <a:pt x="21600" y="21600"/>
-                </a:lnTo>
-              </a:path>
-            </a:pathLst>
-          </a:custGeom>
-          <a:noFill/>
-          <a:ln w="28440">
-            <a:solidFill>
-              <a:srgbClr val="833AA6"/>
-            </a:solidFill>
-            <a:round/>
-            <a:tailEnd type="arrow" w="med" len="med"/>
-          </a:ln>
-        </p:spPr>
-        <p:style>
-          <a:lnRef idx="1">
-            <a:schemeClr val="accent1"/>
-          </a:lnRef>
-          <a:fillRef idx="0">
-            <a:schemeClr val="accent1"/>
-          </a:fillRef>
-          <a:effectRef idx="0">
-            <a:schemeClr val="accent1"/>
-          </a:effectRef>
-          <a:fontRef idx="minor"/>
-        </p:style>
-      </p:sp>
-      <p:sp>
-        <p:nvSpPr>
-          <p:cNvPr id="133" name="CustomShape 23"/>
-          <p:cNvSpPr/>
-          <p:nvPr/>
-        </p:nvSpPr>
-        <p:spPr>
-          <a:xfrm>
-            <a:off x="4717440" y="4439520"/>
-            <a:ext cx="848880" cy="280440"/>
-          </a:xfrm>
-          <a:custGeom>
-            <a:avLst/>
-            <a:gdLst/>
-            <a:ahLst/>
-            <a:cxnLst/>
-            <a:rect l="l" t="t" r="r" b="b"/>
-            <a:pathLst>
-              <a:path w="21600" h="21600">
-                <a:moveTo>
-                  <a:pt x="0" y="0"/>
-                </a:moveTo>
-                <a:lnTo>
-                  <a:pt x="21600" y="21600"/>
-                </a:lnTo>
-              </a:path>
-            </a:pathLst>
-          </a:custGeom>
-          <a:noFill/>
-          <a:ln w="28440">
-            <a:solidFill>
-              <a:srgbClr val="833AA6"/>
-            </a:solidFill>
-            <a:round/>
-            <a:tailEnd type="arrow" w="med" len="med"/>
-          </a:ln>
-        </p:spPr>
-        <p:style>
-          <a:lnRef idx="1">
-            <a:schemeClr val="accent1"/>
-          </a:lnRef>
-          <a:fillRef idx="0">
-            <a:schemeClr val="accent1"/>
-          </a:fillRef>
-          <a:effectRef idx="0">
-            <a:schemeClr val="accent1"/>
-          </a:effectRef>
-          <a:fontRef idx="minor"/>
-        </p:style>
-      </p:sp>
-      <p:sp>
-        <p:nvSpPr>
-          <p:cNvPr id="134" name="CustomShape 24"/>
-          <p:cNvSpPr/>
-          <p:nvPr/>
-        </p:nvSpPr>
-        <p:spPr>
-          <a:xfrm flipV="1">
-            <a:off x="4717440" y="4159800"/>
-            <a:ext cx="848880" cy="280440"/>
-          </a:xfrm>
-          <a:custGeom>
-            <a:avLst/>
-            <a:gdLst/>
-            <a:ahLst/>
-            <a:cxnLst/>
-            <a:rect l="l" t="t" r="r" b="b"/>
-            <a:pathLst>
-              <a:path w="21600" h="21600">
-                <a:moveTo>
-                  <a:pt x="0" y="0"/>
-                </a:moveTo>
-                <a:lnTo>
-                  <a:pt x="21600" y="21600"/>
-                </a:lnTo>
-              </a:path>
-            </a:pathLst>
-          </a:custGeom>
-          <a:noFill/>
-          <a:ln w="28440">
-            <a:solidFill>
-              <a:srgbClr val="833AA6"/>
-            </a:solidFill>
-            <a:round/>
-            <a:tailEnd type="arrow" w="med" len="med"/>
-          </a:ln>
-        </p:spPr>
-        <p:style>
-          <a:lnRef idx="1">
-            <a:schemeClr val="accent1"/>
-          </a:lnRef>
-          <a:fillRef idx="0">
-            <a:schemeClr val="accent1"/>
-          </a:fillRef>
-          <a:effectRef idx="0">
-            <a:schemeClr val="accent1"/>
-          </a:effectRef>
-          <a:fontRef idx="minor"/>
-        </p:style>
-      </p:sp>
-      <p:sp>
-        <p:nvSpPr>
-          <p:cNvPr id="135" name="CustomShape 25"/>
-          <p:cNvSpPr/>
-          <p:nvPr/>
-        </p:nvSpPr>
-        <p:spPr>
-          <a:xfrm>
-            <a:off x="4717440" y="5371560"/>
-            <a:ext cx="848880" cy="360"/>
-          </a:xfrm>
-          <a:custGeom>
-            <a:avLst/>
-            <a:gdLst/>
-            <a:ahLst/>
-            <a:cxnLst/>
-            <a:rect l="l" t="t" r="r" b="b"/>
-            <a:pathLst>
-              <a:path w="21600" h="21600">
-                <a:moveTo>
-                  <a:pt x="0" y="0"/>
-                </a:moveTo>
-                <a:lnTo>
-                  <a:pt x="21600" y="21600"/>
-                </a:lnTo>
-              </a:path>
-            </a:pathLst>
-          </a:custGeom>
-          <a:noFill/>
-          <a:ln w="28440">
-            <a:solidFill>
-              <a:srgbClr val="833AA6"/>
-            </a:solidFill>
-            <a:round/>
-            <a:tailEnd type="arrow" w="med" len="med"/>
-          </a:ln>
-        </p:spPr>
-        <p:style>
-          <a:lnRef idx="1">
-            <a:schemeClr val="accent1"/>
-          </a:lnRef>
-          <a:fillRef idx="0">
-            <a:schemeClr val="accent1"/>
-          </a:fillRef>
-          <a:effectRef idx="0">
-            <a:schemeClr val="accent1"/>
-          </a:effectRef>
-          <a:fontRef idx="minor"/>
-        </p:style>
-      </p:sp>
-      <p:sp>
-        <p:nvSpPr>
-          <p:cNvPr id="136" name="CustomShape 26"/>
-          <p:cNvSpPr/>
-          <p:nvPr/>
-        </p:nvSpPr>
-        <p:spPr>
-          <a:xfrm>
-            <a:off x="4717440" y="5371560"/>
-            <a:ext cx="848880" cy="280440"/>
-          </a:xfrm>
-          <a:custGeom>
-            <a:avLst/>
-            <a:gdLst/>
-            <a:ahLst/>
-            <a:cxnLst/>
-            <a:rect l="l" t="t" r="r" b="b"/>
-            <a:pathLst>
-              <a:path w="21600" h="21600">
-                <a:moveTo>
-                  <a:pt x="0" y="0"/>
-                </a:moveTo>
-                <a:lnTo>
-                  <a:pt x="21600" y="21600"/>
-                </a:lnTo>
-              </a:path>
-            </a:pathLst>
-          </a:custGeom>
-          <a:noFill/>
-          <a:ln w="28440">
-            <a:solidFill>
-              <a:srgbClr val="833AA6"/>
-            </a:solidFill>
-            <a:round/>
-            <a:tailEnd type="arrow" w="med" len="med"/>
-          </a:ln>
-        </p:spPr>
-        <p:style>
-          <a:lnRef idx="1">
-            <a:schemeClr val="accent1"/>
-          </a:lnRef>
-          <a:fillRef idx="0">
-            <a:schemeClr val="accent1"/>
-          </a:fillRef>
-          <a:effectRef idx="0">
-            <a:schemeClr val="accent1"/>
-          </a:effectRef>
-          <a:fontRef idx="minor"/>
-        </p:style>
-      </p:sp>
-      <p:sp>
-        <p:nvSpPr>
-          <p:cNvPr id="137" name="CustomShape 27"/>
-          <p:cNvSpPr/>
-          <p:nvPr/>
-        </p:nvSpPr>
-        <p:spPr>
-          <a:xfrm flipV="1">
-            <a:off x="4717440" y="5092200"/>
-            <a:ext cx="848880" cy="280440"/>
-          </a:xfrm>
-          <a:custGeom>
-            <a:avLst/>
-            <a:gdLst/>
-            <a:ahLst/>
-            <a:cxnLst/>
-            <a:rect l="l" t="t" r="r" b="b"/>
-            <a:pathLst>
-              <a:path w="21600" h="21600">
-                <a:moveTo>
-                  <a:pt x="0" y="0"/>
-                </a:moveTo>
-                <a:lnTo>
-                  <a:pt x="21600" y="21600"/>
-                </a:lnTo>
-              </a:path>
-            </a:pathLst>
-          </a:custGeom>
-          <a:noFill/>
-          <a:ln w="28440">
-            <a:solidFill>
-              <a:srgbClr val="833AA6"/>
-            </a:solidFill>
-            <a:round/>
-            <a:tailEnd type="arrow" w="med" len="med"/>
-          </a:ln>
-        </p:spPr>
-        <p:style>
-          <a:lnRef idx="1">
-            <a:schemeClr val="accent1"/>
-          </a:lnRef>
-          <a:fillRef idx="0">
-            <a:schemeClr val="accent1"/>
-          </a:fillRef>
-          <a:effectRef idx="0">
-            <a:schemeClr val="accent1"/>
-          </a:effectRef>
-          <a:fontRef idx="minor"/>
-        </p:style>
-      </p:sp>
-      <p:sp>
-        <p:nvSpPr>
-          <p:cNvPr id="138" name="CustomShape 28"/>
-          <p:cNvSpPr/>
-          <p:nvPr/>
-        </p:nvSpPr>
-        <p:spPr>
-          <a:xfrm>
-            <a:off x="8295480" y="4424760"/>
-            <a:ext cx="848880" cy="360"/>
-          </a:xfrm>
-          <a:custGeom>
-            <a:avLst/>
-            <a:gdLst/>
-            <a:ahLst/>
-            <a:cxnLst/>
-            <a:rect l="l" t="t" r="r" b="b"/>
-            <a:pathLst>
-              <a:path w="21600" h="21600">
-                <a:moveTo>
-                  <a:pt x="0" y="0"/>
-                </a:moveTo>
-                <a:lnTo>
-                  <a:pt x="21600" y="21600"/>
-                </a:lnTo>
-              </a:path>
-            </a:pathLst>
-          </a:custGeom>
-          <a:noFill/>
-          <a:ln w="28440">
-            <a:solidFill>
-              <a:srgbClr val="833AA6"/>
-            </a:solidFill>
-            <a:round/>
-            <a:tailEnd type="arrow" w="med" len="med"/>
-          </a:ln>
-        </p:spPr>
-        <p:style>
-          <a:lnRef idx="1">
-            <a:schemeClr val="accent1"/>
-          </a:lnRef>
-          <a:fillRef idx="0">
-            <a:schemeClr val="accent1"/>
-          </a:fillRef>
-          <a:effectRef idx="0">
-            <a:schemeClr val="accent1"/>
-          </a:effectRef>
-          <a:fontRef idx="minor"/>
-        </p:style>
-      </p:sp>
-      <p:sp>
-        <p:nvSpPr>
-          <p:cNvPr id="139" name="CustomShape 29"/>
-          <p:cNvSpPr/>
-          <p:nvPr/>
-        </p:nvSpPr>
-        <p:spPr>
-          <a:xfrm flipV="1">
-            <a:off x="8295480" y="4036320"/>
-            <a:ext cx="848880" cy="390240"/>
-          </a:xfrm>
-          <a:custGeom>
-            <a:avLst/>
-            <a:gdLst/>
-            <a:ahLst/>
-            <a:cxnLst/>
-            <a:rect l="l" t="t" r="r" b="b"/>
-            <a:pathLst>
-              <a:path w="21600" h="21600">
-                <a:moveTo>
-                  <a:pt x="0" y="0"/>
-                </a:moveTo>
-                <a:lnTo>
-                  <a:pt x="21600" y="21600"/>
-                </a:lnTo>
-              </a:path>
-            </a:pathLst>
-          </a:custGeom>
-          <a:noFill/>
-          <a:ln w="28440">
-            <a:solidFill>
-              <a:srgbClr val="833AA6"/>
-            </a:solidFill>
-            <a:round/>
-            <a:tailEnd type="arrow" w="med" len="med"/>
-          </a:ln>
-        </p:spPr>
-        <p:style>
-          <a:lnRef idx="1">
-            <a:schemeClr val="accent1"/>
-          </a:lnRef>
-          <a:fillRef idx="0">
-            <a:schemeClr val="accent1"/>
-          </a:fillRef>
-          <a:effectRef idx="0">
-            <a:schemeClr val="accent1"/>
-          </a:effectRef>
-          <a:fontRef idx="minor"/>
-        </p:style>
-      </p:sp>
-      <p:sp>
-        <p:nvSpPr>
-          <p:cNvPr id="140" name="CustomShape 30"/>
-          <p:cNvSpPr/>
-          <p:nvPr/>
-        </p:nvSpPr>
-        <p:spPr>
-          <a:xfrm flipV="1">
-            <a:off x="8295480" y="3649320"/>
-            <a:ext cx="848880" cy="773280"/>
-          </a:xfrm>
-          <a:custGeom>
-            <a:avLst/>
-            <a:gdLst/>
-            <a:ahLst/>
-            <a:cxnLst/>
-            <a:rect l="l" t="t" r="r" b="b"/>
-            <a:pathLst>
-              <a:path w="21600" h="21600">
-                <a:moveTo>
-                  <a:pt x="0" y="0"/>
-                </a:moveTo>
-                <a:lnTo>
-                  <a:pt x="21600" y="21600"/>
-                </a:lnTo>
-              </a:path>
-            </a:pathLst>
-          </a:custGeom>
-          <a:noFill/>
-          <a:ln w="28440">
-            <a:solidFill>
-              <a:srgbClr val="833AA6"/>
-            </a:solidFill>
-            <a:round/>
-            <a:tailEnd type="arrow" w="med" len="med"/>
-          </a:ln>
-        </p:spPr>
-        <p:style>
-          <a:lnRef idx="1">
-            <a:schemeClr val="accent1"/>
-          </a:lnRef>
-          <a:fillRef idx="0">
-            <a:schemeClr val="accent1"/>
-          </a:fillRef>
-          <a:effectRef idx="0">
-            <a:schemeClr val="accent1"/>
-          </a:effectRef>
-          <a:fontRef idx="minor"/>
-        </p:style>
-      </p:sp>
-      <p:sp>
-        <p:nvSpPr>
-          <p:cNvPr id="141" name="CustomShape 31"/>
-          <p:cNvSpPr/>
-          <p:nvPr/>
-        </p:nvSpPr>
-        <p:spPr>
-          <a:xfrm>
-            <a:off x="8304480" y="4417560"/>
-            <a:ext cx="848880" cy="390240"/>
-          </a:xfrm>
-          <a:custGeom>
-            <a:avLst/>
-            <a:gdLst/>
-            <a:ahLst/>
-            <a:cxnLst/>
-            <a:rect l="l" t="t" r="r" b="b"/>
-            <a:pathLst>
-              <a:path w="21600" h="21600">
-                <a:moveTo>
-                  <a:pt x="0" y="0"/>
-                </a:moveTo>
-                <a:lnTo>
-                  <a:pt x="21600" y="21600"/>
-                </a:lnTo>
-              </a:path>
-            </a:pathLst>
-          </a:custGeom>
-          <a:noFill/>
-          <a:ln w="28440">
-            <a:solidFill>
-              <a:srgbClr val="833AA6"/>
-            </a:solidFill>
-            <a:round/>
-            <a:tailEnd type="arrow" w="med" len="med"/>
-          </a:ln>
-        </p:spPr>
-        <p:style>
-          <a:lnRef idx="1">
-            <a:schemeClr val="accent1"/>
-          </a:lnRef>
-          <a:fillRef idx="0">
-            <a:schemeClr val="accent1"/>
-          </a:fillRef>
-          <a:effectRef idx="0">
-            <a:schemeClr val="accent1"/>
-          </a:effectRef>
-          <a:fontRef idx="minor"/>
-        </p:style>
-      </p:sp>
-      <p:sp>
-        <p:nvSpPr>
-          <p:cNvPr id="142" name="CustomShape 32"/>
-          <p:cNvSpPr/>
-          <p:nvPr/>
-        </p:nvSpPr>
-        <p:spPr>
-          <a:xfrm>
-            <a:off x="8304480" y="4422960"/>
-            <a:ext cx="848880" cy="773280"/>
-          </a:xfrm>
-          <a:custGeom>
-            <a:avLst/>
-            <a:gdLst/>
-            <a:ahLst/>
-            <a:cxnLst/>
-            <a:rect l="l" t="t" r="r" b="b"/>
-            <a:pathLst>
-              <a:path w="21600" h="21600">
-                <a:moveTo>
-                  <a:pt x="0" y="0"/>
-                </a:moveTo>
-                <a:lnTo>
-                  <a:pt x="21600" y="21600"/>
-                </a:lnTo>
-              </a:path>
-            </a:pathLst>
-          </a:custGeom>
-          <a:noFill/>
-          <a:ln w="28440">
-            <a:solidFill>
-              <a:srgbClr val="833AA6"/>
-            </a:solidFill>
-            <a:round/>
-            <a:tailEnd type="arrow" w="med" len="med"/>
-          </a:ln>
-        </p:spPr>
-        <p:style>
-          <a:lnRef idx="1">
-            <a:schemeClr val="accent1"/>
-          </a:lnRef>
-          <a:fillRef idx="0">
-            <a:schemeClr val="accent1"/>
-          </a:fillRef>
-          <a:effectRef idx="0">
-            <a:schemeClr val="accent1"/>
-          </a:effectRef>
-          <a:fontRef idx="minor"/>
-        </p:style>
-      </p:sp>
-      <p:sp>
-        <p:nvSpPr>
-          <p:cNvPr id="143" name="CustomShape 33"/>
-          <p:cNvSpPr/>
-          <p:nvPr/>
-        </p:nvSpPr>
-        <p:spPr>
-          <a:xfrm>
-            <a:off x="1673280" y="2634120"/>
-            <a:ext cx="702360" cy="333720"/>
-          </a:xfrm>
-          <a:prstGeom prst="rect">
-            <a:avLst/>
-          </a:prstGeom>
-          <a:noFill/>
-          <a:ln>
-            <a:noFill/>
-          </a:ln>
-        </p:spPr>
-        <p:style>
-          <a:lnRef idx="0">
-            <a:scrgbClr r="0" g="0" b="0"/>
-          </a:lnRef>
-          <a:fillRef idx="0">
-            <a:scrgbClr r="0" g="0" b="0"/>
-          </a:fillRef>
-          <a:effectRef idx="0">
-            <a:scrgbClr r="0" g="0" b="0"/>
-          </a:effectRef>
-          <a:fontRef idx="minor"/>
-        </p:style>
-        <p:txBody>
-          <a:bodyPr wrap="none" lIns="90000" tIns="45000" rIns="90000" bIns="45000"/>
-          <a:lstStyle/>
-          <a:p>
-            <a:pPr>
-              <a:lnSpc>
-                <a:spcPct val="100000"/>
-              </a:lnSpc>
-            </a:pPr>
-            <a:r>
-              <a:rPr lang="en-US" sz="1600" b="0" strike="noStrike" spc="-1">
-                <a:solidFill>
-                  <a:srgbClr val="000000"/>
-                </a:solidFill>
-                <a:uFill>
-                  <a:solidFill>
-                    <a:srgbClr val="FFFFFF"/>
-                  </a:solidFill>
-                </a:uFill>
-                <a:latin typeface="Cambria Math"/>
-                <a:ea typeface="Cambria Math"/>
-              </a:rPr>
-              <a:t>Input</a:t>
-            </a:r>
-            <a:endParaRPr lang="en-US" sz="1800" b="0" strike="noStrike" spc="-1">
-              <a:solidFill>
-                <a:srgbClr val="000000"/>
-              </a:solidFill>
-              <a:uFill>
-                <a:solidFill>
-                  <a:srgbClr val="FFFFFF"/>
-                </a:solidFill>
-              </a:uFill>
-              <a:latin typeface="Arial"/>
-            </a:endParaRPr>
-          </a:p>
-        </p:txBody>
-      </p:sp>
-      <p:sp>
-        <p:nvSpPr>
-          <p:cNvPr id="144" name="CustomShape 34"/>
-          <p:cNvSpPr/>
-          <p:nvPr/>
-        </p:nvSpPr>
-        <p:spPr>
-          <a:xfrm>
-            <a:off x="3394440" y="2515680"/>
-            <a:ext cx="939960" cy="577080"/>
-          </a:xfrm>
-          <a:prstGeom prst="rect">
-            <a:avLst/>
-          </a:prstGeom>
-          <a:noFill/>
-          <a:ln>
-            <a:noFill/>
-          </a:ln>
-        </p:spPr>
-        <p:style>
-          <a:lnRef idx="0">
-            <a:scrgbClr r="0" g="0" b="0"/>
-          </a:lnRef>
-          <a:fillRef idx="0">
-            <a:scrgbClr r="0" g="0" b="0"/>
-          </a:fillRef>
-          <a:effectRef idx="0">
-            <a:scrgbClr r="0" g="0" b="0"/>
-          </a:effectRef>
-          <a:fontRef idx="minor"/>
-        </p:style>
-        <p:txBody>
-          <a:bodyPr wrap="none" lIns="90000" tIns="45000" rIns="90000" bIns="45000"/>
-          <a:lstStyle/>
-          <a:p>
-            <a:pPr>
-              <a:lnSpc>
-                <a:spcPct val="100000"/>
-              </a:lnSpc>
-            </a:pPr>
-            <a:r>
-              <a:rPr lang="en-US" sz="1600" b="0" strike="noStrike" spc="-1">
-                <a:solidFill>
-                  <a:srgbClr val="000000"/>
-                </a:solidFill>
-                <a:uFill>
-                  <a:solidFill>
-                    <a:srgbClr val="FFFFFF"/>
-                  </a:solidFill>
-                </a:uFill>
-                <a:latin typeface="Cambria Math"/>
-                <a:ea typeface="Cambria Math"/>
-              </a:rPr>
-              <a:t>Hidden</a:t>
-            </a:r>
-            <a:endParaRPr lang="en-US" sz="1800" b="0" strike="noStrike" spc="-1">
-              <a:solidFill>
-                <a:srgbClr val="000000"/>
-              </a:solidFill>
-              <a:uFill>
-                <a:solidFill>
-                  <a:srgbClr val="FFFFFF"/>
-                </a:solidFill>
-              </a:uFill>
-              <a:latin typeface="Arial"/>
-            </a:endParaRPr>
-          </a:p>
-          <a:p>
-            <a:pPr>
-              <a:lnSpc>
-                <a:spcPct val="100000"/>
-              </a:lnSpc>
-            </a:pPr>
-            <a:r>
-              <a:rPr lang="en-US" sz="1600" b="0" strike="noStrike" spc="-1">
-                <a:solidFill>
-                  <a:srgbClr val="000000"/>
-                </a:solidFill>
-                <a:uFill>
-                  <a:solidFill>
-                    <a:srgbClr val="FFFFFF"/>
-                  </a:solidFill>
-                </a:uFill>
-                <a:latin typeface="Cambria Math"/>
-                <a:ea typeface="Cambria Math"/>
-              </a:rPr>
-              <a:t>Layer 1</a:t>
-            </a:r>
-            <a:endParaRPr lang="en-US" sz="1800" b="0" strike="noStrike" spc="-1">
-              <a:solidFill>
-                <a:srgbClr val="000000"/>
-              </a:solidFill>
-              <a:uFill>
-                <a:solidFill>
-                  <a:srgbClr val="FFFFFF"/>
-                </a:solidFill>
-              </a:uFill>
-              <a:latin typeface="Arial"/>
-            </a:endParaRPr>
-          </a:p>
-        </p:txBody>
-      </p:sp>
-      <p:sp>
-        <p:nvSpPr>
-          <p:cNvPr id="145" name="CustomShape 35"/>
-          <p:cNvSpPr/>
-          <p:nvPr/>
-        </p:nvSpPr>
-        <p:spPr>
-          <a:xfrm>
-            <a:off x="6850800" y="2511000"/>
-            <a:ext cx="928080" cy="577080"/>
-          </a:xfrm>
-          <a:prstGeom prst="rect">
-            <a:avLst/>
-          </a:prstGeom>
-          <a:noFill/>
-          <a:ln>
-            <a:noFill/>
-          </a:ln>
-        </p:spPr>
-        <p:style>
-          <a:lnRef idx="0">
-            <a:scrgbClr r="0" g="0" b="0"/>
-          </a:lnRef>
-          <a:fillRef idx="0">
-            <a:scrgbClr r="0" g="0" b="0"/>
-          </a:fillRef>
-          <a:effectRef idx="0">
-            <a:scrgbClr r="0" g="0" b="0"/>
-          </a:effectRef>
-          <a:fontRef idx="minor"/>
-        </p:style>
-        <p:txBody>
-          <a:bodyPr wrap="none" lIns="90000" tIns="45000" rIns="90000" bIns="45000"/>
-          <a:lstStyle/>
-          <a:p>
-            <a:pPr>
-              <a:lnSpc>
-                <a:spcPct val="100000"/>
-              </a:lnSpc>
-            </a:pPr>
-            <a:r>
-              <a:rPr lang="en-US" sz="1600" b="0" strike="noStrike" spc="-1">
-                <a:solidFill>
-                  <a:srgbClr val="000000"/>
-                </a:solidFill>
-                <a:uFill>
-                  <a:solidFill>
-                    <a:srgbClr val="FFFFFF"/>
-                  </a:solidFill>
-                </a:uFill>
-                <a:latin typeface="Cambria Math"/>
-                <a:ea typeface="Cambria Math"/>
-              </a:rPr>
-              <a:t>Hidden</a:t>
-            </a:r>
-            <a:endParaRPr lang="en-US" sz="1800" b="0" strike="noStrike" spc="-1">
-              <a:solidFill>
-                <a:srgbClr val="000000"/>
-              </a:solidFill>
-              <a:uFill>
-                <a:solidFill>
-                  <a:srgbClr val="FFFFFF"/>
-                </a:solidFill>
-              </a:uFill>
-              <a:latin typeface="Arial"/>
-            </a:endParaRPr>
-          </a:p>
-          <a:p>
-            <a:pPr>
-              <a:lnSpc>
-                <a:spcPct val="100000"/>
-              </a:lnSpc>
-            </a:pPr>
-            <a:r>
-              <a:rPr lang="en-US" sz="1600" b="0" strike="noStrike" spc="-1">
-                <a:solidFill>
-                  <a:srgbClr val="000000"/>
-                </a:solidFill>
-                <a:uFill>
-                  <a:solidFill>
-                    <a:srgbClr val="FFFFFF"/>
-                  </a:solidFill>
-                </a:uFill>
-                <a:latin typeface="Cambria Math"/>
-                <a:ea typeface="Cambria Math"/>
-              </a:rPr>
-              <a:t>Layer k</a:t>
-            </a:r>
-            <a:endParaRPr lang="en-US" sz="1800" b="0" strike="noStrike" spc="-1">
-              <a:solidFill>
-                <a:srgbClr val="000000"/>
-              </a:solidFill>
-              <a:uFill>
-                <a:solidFill>
-                  <a:srgbClr val="FFFFFF"/>
-                </a:solidFill>
-              </a:uFill>
-              <a:latin typeface="Arial"/>
-            </a:endParaRPr>
-          </a:p>
-        </p:txBody>
-      </p:sp>
-      <p:sp>
-        <p:nvSpPr>
-          <p:cNvPr id="146" name="CustomShape 36"/>
-          <p:cNvSpPr/>
-          <p:nvPr/>
-        </p:nvSpPr>
-        <p:spPr>
-          <a:xfrm>
-            <a:off x="9179640" y="2634120"/>
-            <a:ext cx="882360" cy="333720"/>
-          </a:xfrm>
-          <a:prstGeom prst="rect">
-            <a:avLst/>
-          </a:prstGeom>
-          <a:noFill/>
-          <a:ln>
-            <a:noFill/>
-          </a:ln>
-        </p:spPr>
-        <p:style>
-          <a:lnRef idx="0">
-            <a:scrgbClr r="0" g="0" b="0"/>
-          </a:lnRef>
-          <a:fillRef idx="0">
-            <a:scrgbClr r="0" g="0" b="0"/>
-          </a:fillRef>
-          <a:effectRef idx="0">
-            <a:scrgbClr r="0" g="0" b="0"/>
-          </a:effectRef>
-          <a:fontRef idx="minor"/>
-        </p:style>
-        <p:txBody>
-          <a:bodyPr wrap="none" lIns="90000" tIns="45000" rIns="90000" bIns="45000"/>
-          <a:lstStyle/>
-          <a:p>
-            <a:pPr>
-              <a:lnSpc>
-                <a:spcPct val="100000"/>
-              </a:lnSpc>
-            </a:pPr>
-            <a:r>
-              <a:rPr lang="en-US" sz="1600" b="0" strike="noStrike" spc="-1">
-                <a:solidFill>
-                  <a:srgbClr val="000000"/>
-                </a:solidFill>
-                <a:uFill>
-                  <a:solidFill>
-                    <a:srgbClr val="FFFFFF"/>
-                  </a:solidFill>
-                </a:uFill>
-                <a:latin typeface="Cambria Math"/>
-                <a:ea typeface="Cambria Math"/>
-              </a:rPr>
-              <a:t>Output</a:t>
-            </a:r>
-            <a:endParaRPr lang="en-US" sz="1800" b="0" strike="noStrike" spc="-1">
-              <a:solidFill>
-                <a:srgbClr val="000000"/>
-              </a:solidFill>
-              <a:uFill>
-                <a:solidFill>
-                  <a:srgbClr val="FFFFFF"/>
-                </a:solidFill>
-              </a:uFill>
-              <a:latin typeface="Arial"/>
-            </a:endParaRPr>
-          </a:p>
-        </p:txBody>
-      </p:sp>
-      <p:sp>
-        <p:nvSpPr>
-          <p:cNvPr id="147" name="CustomShape 37"/>
-          <p:cNvSpPr/>
-          <p:nvPr/>
-        </p:nvSpPr>
-        <p:spPr>
-          <a:xfrm>
-            <a:off x="9245520" y="5729400"/>
-            <a:ext cx="751320" cy="364680"/>
-          </a:xfrm>
-          <a:prstGeom prst="rect">
-            <a:avLst/>
-          </a:prstGeom>
-          <a:noFill/>
-          <a:ln>
-            <a:noFill/>
-          </a:ln>
-        </p:spPr>
-        <p:style>
-          <a:lnRef idx="0">
-            <a:scrgbClr r="0" g="0" b="0"/>
-          </a:lnRef>
-          <a:fillRef idx="0">
-            <a:scrgbClr r="0" g="0" b="0"/>
-          </a:fillRef>
-          <a:effectRef idx="0">
-            <a:scrgbClr r="0" g="0" b="0"/>
-          </a:effectRef>
-          <a:fontRef idx="minor"/>
-        </p:style>
-        <p:txBody>
-          <a:bodyPr wrap="none" lIns="90000" tIns="45000" rIns="90000" bIns="45000"/>
-          <a:lstStyle/>
-          <a:p>
-            <a:pPr>
-              <a:lnSpc>
-                <a:spcPct val="100000"/>
-              </a:lnSpc>
-            </a:pPr>
-            <a:r>
-              <a:rPr lang="en-US" sz="1800" b="0" strike="noStrike" spc="-1">
-                <a:solidFill>
-                  <a:srgbClr val="000000"/>
-                </a:solidFill>
-                <a:uFill>
-                  <a:solidFill>
-                    <a:srgbClr val="FFFFFF"/>
-                  </a:solidFill>
-                </a:uFill>
-                <a:latin typeface="Cambria Math"/>
-                <a:ea typeface="Cambria Math"/>
-              </a:rPr>
-              <a:t>5 x 1</a:t>
-            </a:r>
-            <a:endParaRPr lang="en-US" sz="1800" b="0" strike="noStrike" spc="-1">
-              <a:solidFill>
-                <a:srgbClr val="000000"/>
-              </a:solidFill>
-              <a:uFill>
-                <a:solidFill>
-                  <a:srgbClr val="FFFFFF"/>
-                </a:solidFill>
-              </a:uFill>
-              <a:latin typeface="Arial"/>
-            </a:endParaRPr>
-          </a:p>
-        </p:txBody>
-      </p:sp>
-      <p:sp>
-        <p:nvSpPr>
-          <p:cNvPr id="148" name="CustomShape 38"/>
-          <p:cNvSpPr/>
-          <p:nvPr/>
-        </p:nvSpPr>
-        <p:spPr>
-          <a:xfrm>
-            <a:off x="4562640" y="3273480"/>
-            <a:ext cx="472320" cy="466920"/>
-          </a:xfrm>
-          <a:prstGeom prst="ellipse">
-            <a:avLst/>
-          </a:prstGeom>
-          <a:solidFill>
-            <a:schemeClr val="bg1">
-              <a:lumMod val="85000"/>
-            </a:schemeClr>
-          </a:solidFill>
-          <a:ln>
-            <a:noFill/>
-          </a:ln>
-          <a:effectLst>
-            <a:outerShdw blurRad="50800" dist="38100" dir="10800000" algn="r" rotWithShape="0">
-              <a:srgbClr val="000000">
-                <a:alpha val="40000"/>
-              </a:srgbClr>
-            </a:outerShdw>
-          </a:effectLst>
-        </p:spPr>
-        <p:style>
-          <a:lnRef idx="2">
-            <a:schemeClr val="accent1">
-              <a:shade val="50000"/>
-            </a:schemeClr>
-          </a:lnRef>
-          <a:fillRef idx="1">
-            <a:schemeClr val="accent1"/>
-          </a:fillRef>
-          <a:effectRef idx="0">
-            <a:schemeClr val="accent1"/>
-          </a:effectRef>
-          <a:fontRef idx="minor"/>
-        </p:style>
-      </p:sp>
-      <p:sp>
-        <p:nvSpPr>
-          <p:cNvPr id="149" name="CustomShape 39"/>
-          <p:cNvSpPr/>
-          <p:nvPr/>
-        </p:nvSpPr>
-        <p:spPr>
-          <a:xfrm>
-            <a:off x="4489920" y="3323160"/>
-            <a:ext cx="588240" cy="331920"/>
-          </a:xfrm>
-          <a:prstGeom prst="rect">
-            <a:avLst/>
-          </a:prstGeom>
-          <a:noFill/>
-          <a:ln>
-            <a:noFill/>
-          </a:ln>
-        </p:spPr>
-        <p:style>
-          <a:lnRef idx="0">
-            <a:scrgbClr r="0" g="0" b="0"/>
-          </a:lnRef>
-          <a:fillRef idx="0">
-            <a:scrgbClr r="0" g="0" b="0"/>
-          </a:fillRef>
-          <a:effectRef idx="0">
-            <a:scrgbClr r="0" g="0" b="0"/>
-          </a:effectRef>
-          <a:fontRef idx="minor"/>
-        </p:style>
-        <p:txBody>
-          <a:bodyPr wrap="none" lIns="90000" tIns="45000" rIns="90000" bIns="45000"/>
-          <a:lstStyle/>
-          <a:p>
-            <a:pPr>
-              <a:lnSpc>
-                <a:spcPct val="100000"/>
-              </a:lnSpc>
-            </a:pPr>
-            <a:r>
-              <a:rPr lang="en-US" sz="1400" b="0" i="1" strike="noStrike" spc="-1">
-                <a:solidFill>
-                  <a:srgbClr val="000000"/>
-                </a:solidFill>
-                <a:uFill>
-                  <a:solidFill>
-                    <a:srgbClr val="FFFFFF"/>
-                  </a:solidFill>
-                </a:uFill>
-                <a:latin typeface="Cambria Math"/>
-                <a:ea typeface="Cambria Math"/>
-              </a:rPr>
-              <a:t>a</a:t>
-            </a:r>
-            <a:r>
-              <a:rPr lang="en-US" sz="1400" b="0" i="1" strike="noStrike" spc="-1" baseline="-25000">
-                <a:solidFill>
-                  <a:srgbClr val="000000"/>
-                </a:solidFill>
-                <a:uFill>
-                  <a:solidFill>
-                    <a:srgbClr val="FFFFFF"/>
-                  </a:solidFill>
-                </a:uFill>
-                <a:latin typeface="Cambria Math"/>
-                <a:ea typeface="Cambria Math"/>
-              </a:rPr>
-              <a:t>h</a:t>
-            </a:r>
-            <a:r>
-              <a:rPr lang="en-US" sz="1400" b="0" i="1" strike="noStrike" spc="-1">
-                <a:solidFill>
-                  <a:srgbClr val="000000"/>
-                </a:solidFill>
-                <a:uFill>
-                  <a:solidFill>
-                    <a:srgbClr val="FFFFFF"/>
-                  </a:solidFill>
-                </a:uFill>
-                <a:latin typeface="Cambria Math"/>
-                <a:ea typeface="Cambria Math"/>
-              </a:rPr>
-              <a:t>(z)</a:t>
-            </a:r>
-            <a:endParaRPr lang="en-US" sz="1800" b="0" strike="noStrike" spc="-1">
-              <a:solidFill>
-                <a:srgbClr val="000000"/>
-              </a:solidFill>
-              <a:uFill>
-                <a:solidFill>
-                  <a:srgbClr val="FFFFFF"/>
-                </a:solidFill>
-              </a:uFill>
-              <a:latin typeface="Arial"/>
-            </a:endParaRPr>
-          </a:p>
-        </p:txBody>
-      </p:sp>
-      <p:sp>
-        <p:nvSpPr>
-          <p:cNvPr id="150" name="CustomShape 40"/>
-          <p:cNvSpPr/>
-          <p:nvPr/>
-        </p:nvSpPr>
-        <p:spPr>
-          <a:xfrm>
-            <a:off x="4562640" y="4191480"/>
-            <a:ext cx="472320" cy="466920"/>
-          </a:xfrm>
-          <a:prstGeom prst="ellipse">
-            <a:avLst/>
-          </a:prstGeom>
-          <a:solidFill>
-            <a:schemeClr val="bg1">
-              <a:lumMod val="85000"/>
-            </a:schemeClr>
-          </a:solidFill>
-          <a:ln>
-            <a:noFill/>
-          </a:ln>
-          <a:effectLst>
-            <a:outerShdw blurRad="50800" dist="38100" dir="10800000" algn="r" rotWithShape="0">
-              <a:srgbClr val="000000">
-                <a:alpha val="40000"/>
-              </a:srgbClr>
-            </a:outerShdw>
-          </a:effectLst>
-        </p:spPr>
-        <p:style>
-          <a:lnRef idx="2">
-            <a:schemeClr val="accent1">
-              <a:shade val="50000"/>
-            </a:schemeClr>
-          </a:lnRef>
-          <a:fillRef idx="1">
-            <a:schemeClr val="accent1"/>
-          </a:fillRef>
-          <a:effectRef idx="0">
-            <a:schemeClr val="accent1"/>
-          </a:effectRef>
-          <a:fontRef idx="minor"/>
-        </p:style>
-      </p:sp>
-      <p:sp>
-        <p:nvSpPr>
-          <p:cNvPr id="151" name="CustomShape 41"/>
-          <p:cNvSpPr/>
-          <p:nvPr/>
-        </p:nvSpPr>
-        <p:spPr>
-          <a:xfrm>
-            <a:off x="4489920" y="4241160"/>
-            <a:ext cx="588240" cy="331920"/>
-          </a:xfrm>
-          <a:prstGeom prst="rect">
-            <a:avLst/>
-          </a:prstGeom>
-          <a:noFill/>
-          <a:ln>
-            <a:noFill/>
-          </a:ln>
-        </p:spPr>
-        <p:style>
-          <a:lnRef idx="0">
-            <a:scrgbClr r="0" g="0" b="0"/>
-          </a:lnRef>
-          <a:fillRef idx="0">
-            <a:scrgbClr r="0" g="0" b="0"/>
-          </a:fillRef>
-          <a:effectRef idx="0">
-            <a:scrgbClr r="0" g="0" b="0"/>
-          </a:effectRef>
-          <a:fontRef idx="minor"/>
-        </p:style>
-        <p:txBody>
-          <a:bodyPr wrap="none" lIns="90000" tIns="45000" rIns="90000" bIns="45000"/>
-          <a:lstStyle/>
-          <a:p>
-            <a:pPr>
-              <a:lnSpc>
-                <a:spcPct val="100000"/>
-              </a:lnSpc>
-            </a:pPr>
-            <a:r>
-              <a:rPr lang="en-US" sz="1400" b="0" i="1" strike="noStrike" spc="-1">
-                <a:solidFill>
-                  <a:srgbClr val="000000"/>
-                </a:solidFill>
-                <a:uFill>
-                  <a:solidFill>
-                    <a:srgbClr val="FFFFFF"/>
-                  </a:solidFill>
-                </a:uFill>
-                <a:latin typeface="Cambria Math"/>
-                <a:ea typeface="Cambria Math"/>
-              </a:rPr>
-              <a:t>a</a:t>
-            </a:r>
-            <a:r>
-              <a:rPr lang="en-US" sz="1400" b="0" i="1" strike="noStrike" spc="-1" baseline="-25000">
-                <a:solidFill>
-                  <a:srgbClr val="000000"/>
-                </a:solidFill>
-                <a:uFill>
-                  <a:solidFill>
-                    <a:srgbClr val="FFFFFF"/>
-                  </a:solidFill>
-                </a:uFill>
-                <a:latin typeface="Cambria Math"/>
-                <a:ea typeface="Cambria Math"/>
-              </a:rPr>
-              <a:t>h</a:t>
-            </a:r>
-            <a:r>
-              <a:rPr lang="en-US" sz="1400" b="0" i="1" strike="noStrike" spc="-1">
-                <a:solidFill>
-                  <a:srgbClr val="000000"/>
-                </a:solidFill>
-                <a:uFill>
-                  <a:solidFill>
-                    <a:srgbClr val="FFFFFF"/>
-                  </a:solidFill>
-                </a:uFill>
-                <a:latin typeface="Cambria Math"/>
-                <a:ea typeface="Cambria Math"/>
-              </a:rPr>
-              <a:t>(z)</a:t>
-            </a:r>
-            <a:endParaRPr lang="en-US" sz="1800" b="0" strike="noStrike" spc="-1">
-              <a:solidFill>
-                <a:srgbClr val="000000"/>
-              </a:solidFill>
-              <a:uFill>
-                <a:solidFill>
-                  <a:srgbClr val="FFFFFF"/>
-                </a:solidFill>
-              </a:uFill>
-              <a:latin typeface="Arial"/>
-            </a:endParaRPr>
-          </a:p>
-        </p:txBody>
-      </p:sp>
-      <p:sp>
-        <p:nvSpPr>
-          <p:cNvPr id="152" name="CustomShape 42"/>
-          <p:cNvSpPr/>
-          <p:nvPr/>
-        </p:nvSpPr>
-        <p:spPr>
-          <a:xfrm>
-            <a:off x="4562640" y="5159160"/>
-            <a:ext cx="472320" cy="466920"/>
-          </a:xfrm>
-          <a:prstGeom prst="ellipse">
-            <a:avLst/>
-          </a:prstGeom>
-          <a:solidFill>
-            <a:schemeClr val="bg1">
-              <a:lumMod val="85000"/>
-            </a:schemeClr>
-          </a:solidFill>
-          <a:ln>
-            <a:noFill/>
-          </a:ln>
-          <a:effectLst>
-            <a:outerShdw blurRad="50800" dist="38100" dir="10800000" algn="r" rotWithShape="0">
-              <a:srgbClr val="000000">
-                <a:alpha val="40000"/>
-              </a:srgbClr>
-            </a:outerShdw>
-          </a:effectLst>
-        </p:spPr>
-        <p:style>
-          <a:lnRef idx="2">
-            <a:schemeClr val="accent1">
-              <a:shade val="50000"/>
-            </a:schemeClr>
-          </a:lnRef>
-          <a:fillRef idx="1">
-            <a:schemeClr val="accent1"/>
-          </a:fillRef>
-          <a:effectRef idx="0">
-            <a:schemeClr val="accent1"/>
-          </a:effectRef>
-          <a:fontRef idx="minor"/>
-        </p:style>
-      </p:sp>
-      <p:sp>
-        <p:nvSpPr>
-          <p:cNvPr id="153" name="CustomShape 43"/>
-          <p:cNvSpPr/>
-          <p:nvPr/>
-        </p:nvSpPr>
-        <p:spPr>
-          <a:xfrm>
-            <a:off x="4489920" y="5208840"/>
-            <a:ext cx="588240" cy="331920"/>
-          </a:xfrm>
-          <a:prstGeom prst="rect">
-            <a:avLst/>
-          </a:prstGeom>
-          <a:noFill/>
-          <a:ln>
-            <a:noFill/>
-          </a:ln>
-        </p:spPr>
-        <p:style>
-          <a:lnRef idx="0">
-            <a:scrgbClr r="0" g="0" b="0"/>
-          </a:lnRef>
-          <a:fillRef idx="0">
-            <a:scrgbClr r="0" g="0" b="0"/>
-          </a:fillRef>
-          <a:effectRef idx="0">
-            <a:scrgbClr r="0" g="0" b="0"/>
-          </a:effectRef>
-          <a:fontRef idx="minor"/>
-        </p:style>
-        <p:txBody>
-          <a:bodyPr wrap="none" lIns="90000" tIns="45000" rIns="90000" bIns="45000"/>
-          <a:lstStyle/>
-          <a:p>
-            <a:pPr>
-              <a:lnSpc>
-                <a:spcPct val="100000"/>
-              </a:lnSpc>
-            </a:pPr>
-            <a:r>
-              <a:rPr lang="en-US" sz="1400" b="0" i="1" strike="noStrike" spc="-1">
-                <a:solidFill>
-                  <a:srgbClr val="000000"/>
-                </a:solidFill>
-                <a:uFill>
-                  <a:solidFill>
-                    <a:srgbClr val="FFFFFF"/>
-                  </a:solidFill>
-                </a:uFill>
-                <a:latin typeface="Cambria Math"/>
-                <a:ea typeface="Cambria Math"/>
-              </a:rPr>
-              <a:t>a</a:t>
-            </a:r>
-            <a:r>
-              <a:rPr lang="en-US" sz="1400" b="0" i="1" strike="noStrike" spc="-1" baseline="-25000">
-                <a:solidFill>
-                  <a:srgbClr val="000000"/>
-                </a:solidFill>
-                <a:uFill>
-                  <a:solidFill>
-                    <a:srgbClr val="FFFFFF"/>
-                  </a:solidFill>
-                </a:uFill>
-                <a:latin typeface="Cambria Math"/>
-                <a:ea typeface="Cambria Math"/>
-              </a:rPr>
-              <a:t>h</a:t>
-            </a:r>
-            <a:r>
-              <a:rPr lang="en-US" sz="1400" b="0" i="1" strike="noStrike" spc="-1">
-                <a:solidFill>
-                  <a:srgbClr val="000000"/>
-                </a:solidFill>
-                <a:uFill>
-                  <a:solidFill>
-                    <a:srgbClr val="FFFFFF"/>
-                  </a:solidFill>
-                </a:uFill>
-                <a:latin typeface="Cambria Math"/>
-                <a:ea typeface="Cambria Math"/>
-              </a:rPr>
-              <a:t>(z)</a:t>
-            </a:r>
-            <a:endParaRPr lang="en-US" sz="1800" b="0" strike="noStrike" spc="-1">
-              <a:solidFill>
-                <a:srgbClr val="000000"/>
-              </a:solidFill>
-              <a:uFill>
-                <a:solidFill>
-                  <a:srgbClr val="FFFFFF"/>
-                </a:solidFill>
-              </a:uFill>
-              <a:latin typeface="Arial"/>
-            </a:endParaRPr>
-          </a:p>
-        </p:txBody>
-      </p:sp>
-      <p:sp>
-        <p:nvSpPr>
-          <p:cNvPr id="154" name="CustomShape 44"/>
-          <p:cNvSpPr/>
-          <p:nvPr/>
-        </p:nvSpPr>
-        <p:spPr>
-          <a:xfrm>
-            <a:off x="8028360" y="4191480"/>
-            <a:ext cx="472320" cy="466920"/>
-          </a:xfrm>
-          <a:prstGeom prst="ellipse">
-            <a:avLst/>
-          </a:prstGeom>
-          <a:solidFill>
-            <a:schemeClr val="bg1">
-              <a:lumMod val="85000"/>
-            </a:schemeClr>
-          </a:solidFill>
-          <a:ln>
-            <a:noFill/>
-          </a:ln>
-          <a:effectLst>
-            <a:outerShdw blurRad="50800" dist="38100" dir="10800000" algn="r" rotWithShape="0">
-              <a:srgbClr val="000000">
-                <a:alpha val="40000"/>
-              </a:srgbClr>
-            </a:outerShdw>
-          </a:effectLst>
-        </p:spPr>
-        <p:style>
-          <a:lnRef idx="2">
-            <a:schemeClr val="accent1">
-              <a:shade val="50000"/>
-            </a:schemeClr>
-          </a:lnRef>
-          <a:fillRef idx="1">
-            <a:schemeClr val="accent1"/>
-          </a:fillRef>
-          <a:effectRef idx="0">
-            <a:schemeClr val="accent1"/>
-          </a:effectRef>
-          <a:fontRef idx="minor"/>
-        </p:style>
-      </p:sp>
-      <p:sp>
-        <p:nvSpPr>
-          <p:cNvPr id="155" name="CustomShape 45"/>
-          <p:cNvSpPr/>
-          <p:nvPr/>
-        </p:nvSpPr>
-        <p:spPr>
-          <a:xfrm>
-            <a:off x="7925760" y="4241160"/>
-            <a:ext cx="693360" cy="331920"/>
-          </a:xfrm>
-          <a:prstGeom prst="rect">
-            <a:avLst/>
-          </a:prstGeom>
-          <a:noFill/>
-          <a:ln>
-            <a:noFill/>
-          </a:ln>
-        </p:spPr>
-        <p:style>
-          <a:lnRef idx="0">
-            <a:scrgbClr r="0" g="0" b="0"/>
-          </a:lnRef>
-          <a:fillRef idx="0">
-            <a:scrgbClr r="0" g="0" b="0"/>
-          </a:fillRef>
-          <a:effectRef idx="0">
-            <a:scrgbClr r="0" g="0" b="0"/>
-          </a:effectRef>
-          <a:fontRef idx="minor"/>
-        </p:style>
-        <p:txBody>
-          <a:bodyPr wrap="none" lIns="90000" tIns="45000" rIns="90000" bIns="45000"/>
-          <a:lstStyle/>
-          <a:p>
-            <a:pPr>
-              <a:lnSpc>
-                <a:spcPct val="100000"/>
-              </a:lnSpc>
-            </a:pPr>
-            <a:r>
-              <a:rPr lang="en-US" sz="1400" b="0" i="1" strike="noStrike" spc="-1">
-                <a:solidFill>
-                  <a:srgbClr val="000000"/>
-                </a:solidFill>
-                <a:uFill>
-                  <a:solidFill>
-                    <a:srgbClr val="FFFFFF"/>
-                  </a:solidFill>
-                </a:uFill>
-                <a:latin typeface="Cambria Math"/>
-                <a:ea typeface="Cambria Math"/>
-              </a:rPr>
-              <a:t>a</a:t>
-            </a:r>
-            <a:r>
-              <a:rPr lang="en-US" sz="1400" b="0" i="1" strike="noStrike" spc="-1" baseline="-25000">
-                <a:solidFill>
-                  <a:srgbClr val="000000"/>
-                </a:solidFill>
-                <a:uFill>
-                  <a:solidFill>
-                    <a:srgbClr val="FFFFFF"/>
-                  </a:solidFill>
-                </a:uFill>
-                <a:latin typeface="Cambria Math"/>
-                <a:ea typeface="Cambria Math"/>
-              </a:rPr>
-              <a:t>out</a:t>
-            </a:r>
-            <a:r>
-              <a:rPr lang="en-US" sz="1400" b="0" i="1" strike="noStrike" spc="-1">
-                <a:solidFill>
-                  <a:srgbClr val="000000"/>
-                </a:solidFill>
-                <a:uFill>
-                  <a:solidFill>
-                    <a:srgbClr val="FFFFFF"/>
-                  </a:solidFill>
-                </a:uFill>
-                <a:latin typeface="Cambria Math"/>
-                <a:ea typeface="Cambria Math"/>
-              </a:rPr>
-              <a:t>(z)</a:t>
-            </a:r>
-            <a:endParaRPr lang="en-US" sz="1800" b="0" strike="noStrike" spc="-1">
-              <a:solidFill>
-                <a:srgbClr val="000000"/>
-              </a:solidFill>
-              <a:uFill>
-                <a:solidFill>
-                  <a:srgbClr val="FFFFFF"/>
-                </a:solidFill>
-              </a:uFill>
-              <a:latin typeface="Arial"/>
-            </a:endParaRPr>
-          </a:p>
-        </p:txBody>
-      </p:sp>
-      <p:sp>
-        <p:nvSpPr>
-          <p:cNvPr id="156" name="CustomShape 46"/>
-          <p:cNvSpPr/>
-          <p:nvPr/>
-        </p:nvSpPr>
-        <p:spPr>
-          <a:xfrm>
-            <a:off x="4347360" y="5392800"/>
-            <a:ext cx="240480" cy="360"/>
-          </a:xfrm>
-          <a:custGeom>
-            <a:avLst/>
-            <a:gdLst/>
-            <a:ahLst/>
-            <a:cxnLst/>
-            <a:rect l="l" t="t" r="r" b="b"/>
-            <a:pathLst>
-              <a:path w="21600" h="21600">
-                <a:moveTo>
-                  <a:pt x="0" y="0"/>
-                </a:moveTo>
-                <a:lnTo>
-                  <a:pt x="21600" y="21600"/>
-                </a:lnTo>
-              </a:path>
-            </a:pathLst>
-          </a:custGeom>
-          <a:noFill/>
-          <a:ln w="28440">
-            <a:solidFill>
-              <a:srgbClr val="FF0000"/>
-            </a:solidFill>
-            <a:round/>
-            <a:tailEnd type="arrow" w="med" len="med"/>
-          </a:ln>
-        </p:spPr>
-        <p:style>
-          <a:lnRef idx="1">
-            <a:schemeClr val="accent1"/>
-          </a:lnRef>
-          <a:fillRef idx="0">
-            <a:schemeClr val="accent1"/>
-          </a:fillRef>
-          <a:effectRef idx="0">
-            <a:schemeClr val="accent1"/>
-          </a:effectRef>
-          <a:fontRef idx="minor"/>
-        </p:style>
-      </p:sp>
-      <p:sp>
-        <p:nvSpPr>
-          <p:cNvPr id="157" name="CustomShape 47"/>
-          <p:cNvSpPr/>
-          <p:nvPr/>
-        </p:nvSpPr>
-        <p:spPr>
-          <a:xfrm>
-            <a:off x="4347360" y="4419000"/>
-            <a:ext cx="240480" cy="360"/>
-          </a:xfrm>
-          <a:custGeom>
-            <a:avLst/>
-            <a:gdLst/>
-            <a:ahLst/>
-            <a:cxnLst/>
-            <a:rect l="l" t="t" r="r" b="b"/>
-            <a:pathLst>
-              <a:path w="21600" h="21600">
-                <a:moveTo>
-                  <a:pt x="0" y="0"/>
-                </a:moveTo>
-                <a:lnTo>
-                  <a:pt x="21600" y="21600"/>
-                </a:lnTo>
-              </a:path>
-            </a:pathLst>
-          </a:custGeom>
-          <a:noFill/>
-          <a:ln w="28440">
-            <a:solidFill>
-              <a:srgbClr val="FF0000"/>
-            </a:solidFill>
-            <a:round/>
-            <a:tailEnd type="arrow" w="med" len="med"/>
-          </a:ln>
-        </p:spPr>
-        <p:style>
-          <a:lnRef idx="1">
-            <a:schemeClr val="accent1"/>
-          </a:lnRef>
-          <a:fillRef idx="0">
-            <a:schemeClr val="accent1"/>
-          </a:fillRef>
-          <a:effectRef idx="0">
-            <a:schemeClr val="accent1"/>
-          </a:effectRef>
-          <a:fontRef idx="minor"/>
-        </p:style>
-      </p:sp>
-      <p:sp>
-        <p:nvSpPr>
-          <p:cNvPr id="158" name="CustomShape 48"/>
-          <p:cNvSpPr/>
-          <p:nvPr/>
-        </p:nvSpPr>
-        <p:spPr>
-          <a:xfrm>
-            <a:off x="4347360" y="3507120"/>
-            <a:ext cx="240480" cy="360"/>
-          </a:xfrm>
-          <a:custGeom>
-            <a:avLst/>
-            <a:gdLst/>
-            <a:ahLst/>
-            <a:cxnLst/>
-            <a:rect l="l" t="t" r="r" b="b"/>
-            <a:pathLst>
-              <a:path w="21600" h="21600">
-                <a:moveTo>
-                  <a:pt x="0" y="0"/>
-                </a:moveTo>
-                <a:lnTo>
-                  <a:pt x="21600" y="21600"/>
-                </a:lnTo>
-              </a:path>
-            </a:pathLst>
-          </a:custGeom>
-          <a:noFill/>
-          <a:ln w="28440">
-            <a:solidFill>
-              <a:srgbClr val="FF0000"/>
-            </a:solidFill>
-            <a:round/>
-            <a:tailEnd type="arrow" w="med" len="med"/>
-          </a:ln>
-        </p:spPr>
-        <p:style>
-          <a:lnRef idx="1">
-            <a:schemeClr val="accent1"/>
-          </a:lnRef>
-          <a:fillRef idx="0">
-            <a:schemeClr val="accent1"/>
-          </a:fillRef>
-          <a:effectRef idx="0">
-            <a:schemeClr val="accent1"/>
-          </a:effectRef>
-          <a:fontRef idx="minor"/>
-        </p:style>
-      </p:sp>
-      <p:sp>
-        <p:nvSpPr>
-          <p:cNvPr id="159" name="CustomShape 49"/>
-          <p:cNvSpPr/>
-          <p:nvPr/>
-        </p:nvSpPr>
-        <p:spPr>
-          <a:xfrm>
-            <a:off x="7796160" y="4424760"/>
-            <a:ext cx="240480" cy="360"/>
-          </a:xfrm>
-          <a:custGeom>
-            <a:avLst/>
-            <a:gdLst/>
-            <a:ahLst/>
-            <a:cxnLst/>
-            <a:rect l="l" t="t" r="r" b="b"/>
-            <a:pathLst>
-              <a:path w="21600" h="21600">
-                <a:moveTo>
-                  <a:pt x="0" y="0"/>
-                </a:moveTo>
-                <a:lnTo>
-                  <a:pt x="21600" y="21600"/>
-                </a:lnTo>
-              </a:path>
-            </a:pathLst>
-          </a:custGeom>
-          <a:noFill/>
-          <a:ln w="28440">
-            <a:solidFill>
-              <a:srgbClr val="FF0000"/>
-            </a:solidFill>
-            <a:round/>
-            <a:tailEnd type="arrow" w="med" len="med"/>
-          </a:ln>
-        </p:spPr>
-        <p:style>
-          <a:lnRef idx="1">
-            <a:schemeClr val="accent1"/>
-          </a:lnRef>
-          <a:fillRef idx="0">
-            <a:schemeClr val="accent1"/>
-          </a:fillRef>
-          <a:effectRef idx="0">
-            <a:schemeClr val="accent1"/>
-          </a:effectRef>
-          <a:fontRef idx="minor"/>
-        </p:style>
-      </p:sp>
-      <p:sp>
-        <p:nvSpPr>
-          <p:cNvPr id="160" name="CustomShape 50"/>
-          <p:cNvSpPr/>
-          <p:nvPr/>
-        </p:nvSpPr>
-        <p:spPr>
-          <a:xfrm>
-            <a:off x="3292200" y="5780160"/>
-            <a:ext cx="1144080" cy="366480"/>
-          </a:xfrm>
-          <a:prstGeom prst="rect">
-            <a:avLst/>
-          </a:prstGeom>
-          <a:noFill/>
-          <a:ln>
-            <a:noFill/>
-          </a:ln>
-        </p:spPr>
-        <p:style>
-          <a:lnRef idx="0">
-            <a:scrgbClr r="0" g="0" b="0"/>
-          </a:lnRef>
-          <a:fillRef idx="0">
-            <a:scrgbClr r="0" g="0" b="0"/>
-          </a:fillRef>
-          <a:effectRef idx="0">
-            <a:scrgbClr r="0" g="0" b="0"/>
-          </a:effectRef>
-          <a:fontRef idx="minor"/>
-        </p:style>
-        <p:txBody>
-          <a:bodyPr wrap="none" lIns="90000" tIns="45000" rIns="90000" bIns="45000"/>
-          <a:lstStyle/>
-          <a:p>
-            <a:pPr>
-              <a:lnSpc>
-                <a:spcPct val="100000"/>
-              </a:lnSpc>
-            </a:pPr>
-            <a:r>
-              <a:rPr lang="en-US" sz="1600" b="0" i="1" strike="noStrike" spc="-1">
-                <a:solidFill>
-                  <a:srgbClr val="000000"/>
-                </a:solidFill>
-                <a:uFill>
-                  <a:solidFill>
-                    <a:srgbClr val="FFFFFF"/>
-                  </a:solidFill>
-                </a:uFill>
-                <a:latin typeface="Cambria Math"/>
-                <a:ea typeface="Cambria Math"/>
-              </a:rPr>
-              <a:t>N</a:t>
-            </a:r>
-            <a:r>
-              <a:rPr lang="en-US" sz="1600" b="0" i="1" strike="noStrike" spc="-1" baseline="-25000">
-                <a:solidFill>
-                  <a:srgbClr val="000000"/>
-                </a:solidFill>
-                <a:uFill>
-                  <a:solidFill>
-                    <a:srgbClr val="FFFFFF"/>
-                  </a:solidFill>
-                </a:uFill>
-                <a:latin typeface="Cambria Math"/>
-                <a:ea typeface="Cambria Math"/>
-              </a:rPr>
-              <a:t>L1</a:t>
-            </a:r>
-            <a:r>
-              <a:rPr lang="en-US" sz="1600" b="0" i="1" strike="noStrike" spc="-1">
-                <a:solidFill>
-                  <a:srgbClr val="000000"/>
-                </a:solidFill>
-                <a:uFill>
-                  <a:solidFill>
-                    <a:srgbClr val="FFFFFF"/>
-                  </a:solidFill>
-                </a:uFill>
-                <a:latin typeface="Cambria Math"/>
-                <a:ea typeface="Cambria Math"/>
-              </a:rPr>
-              <a:t> nodes</a:t>
-            </a:r>
-            <a:endParaRPr lang="en-US" sz="1800" b="0" strike="noStrike" spc="-1">
-              <a:solidFill>
-                <a:srgbClr val="000000"/>
-              </a:solidFill>
-              <a:uFill>
-                <a:solidFill>
-                  <a:srgbClr val="FFFFFF"/>
-                </a:solidFill>
-              </a:uFill>
-              <a:latin typeface="Arial"/>
-            </a:endParaRPr>
-          </a:p>
-        </p:txBody>
-      </p:sp>
-      <p:sp>
-        <p:nvSpPr>
-          <p:cNvPr id="161" name="CustomShape 51"/>
-          <p:cNvSpPr/>
-          <p:nvPr/>
-        </p:nvSpPr>
-        <p:spPr>
-          <a:xfrm>
-            <a:off x="6749640" y="5760000"/>
-            <a:ext cx="1138320" cy="366480"/>
-          </a:xfrm>
-          <a:prstGeom prst="rect">
-            <a:avLst/>
-          </a:prstGeom>
-          <a:noFill/>
-          <a:ln>
-            <a:noFill/>
-          </a:ln>
-        </p:spPr>
-        <p:style>
-          <a:lnRef idx="0">
-            <a:scrgbClr r="0" g="0" b="0"/>
-          </a:lnRef>
-          <a:fillRef idx="0">
-            <a:scrgbClr r="0" g="0" b="0"/>
-          </a:fillRef>
-          <a:effectRef idx="0">
-            <a:scrgbClr r="0" g="0" b="0"/>
-          </a:effectRef>
-          <a:fontRef idx="minor"/>
-        </p:style>
-        <p:txBody>
-          <a:bodyPr wrap="none" lIns="90000" tIns="45000" rIns="90000" bIns="45000"/>
-          <a:lstStyle/>
-          <a:p>
-            <a:pPr>
-              <a:lnSpc>
-                <a:spcPct val="100000"/>
-              </a:lnSpc>
-            </a:pPr>
-            <a:r>
-              <a:rPr lang="en-US" sz="1600" b="0" i="1" strike="noStrike" spc="-1">
-                <a:solidFill>
-                  <a:srgbClr val="000000"/>
-                </a:solidFill>
-                <a:uFill>
-                  <a:solidFill>
-                    <a:srgbClr val="FFFFFF"/>
-                  </a:solidFill>
-                </a:uFill>
-                <a:latin typeface="Cambria Math"/>
-                <a:ea typeface="Cambria Math"/>
-              </a:rPr>
-              <a:t>N</a:t>
-            </a:r>
-            <a:r>
-              <a:rPr lang="en-US" sz="1600" b="0" i="1" strike="noStrike" spc="-1" baseline="-25000">
-                <a:solidFill>
-                  <a:srgbClr val="000000"/>
-                </a:solidFill>
-                <a:uFill>
-                  <a:solidFill>
-                    <a:srgbClr val="FFFFFF"/>
-                  </a:solidFill>
-                </a:uFill>
-                <a:latin typeface="Cambria Math"/>
-                <a:ea typeface="Cambria Math"/>
-              </a:rPr>
-              <a:t>Lk</a:t>
-            </a:r>
-            <a:r>
-              <a:rPr lang="en-US" sz="1600" b="0" i="1" strike="noStrike" spc="-1">
-                <a:solidFill>
-                  <a:srgbClr val="000000"/>
-                </a:solidFill>
-                <a:uFill>
-                  <a:solidFill>
-                    <a:srgbClr val="FFFFFF"/>
-                  </a:solidFill>
-                </a:uFill>
-                <a:latin typeface="Cambria Math"/>
-                <a:ea typeface="Cambria Math"/>
-              </a:rPr>
-              <a:t> nodes</a:t>
-            </a:r>
-            <a:endParaRPr lang="en-US" sz="1800" b="0" strike="noStrike" spc="-1">
-              <a:solidFill>
-                <a:srgbClr val="000000"/>
-              </a:solidFill>
-              <a:uFill>
-                <a:solidFill>
-                  <a:srgbClr val="FFFFFF"/>
-                </a:solidFill>
-              </a:uFill>
-              <a:latin typeface="Arial"/>
-            </a:endParaRPr>
-          </a:p>
-        </p:txBody>
-      </p:sp>
-      <p:sp>
-        <p:nvSpPr>
-          <p:cNvPr id="162" name="CustomShape 52"/>
-          <p:cNvSpPr/>
-          <p:nvPr/>
-        </p:nvSpPr>
-        <p:spPr>
-          <a:xfrm>
-            <a:off x="5531040" y="4089600"/>
-            <a:ext cx="534600" cy="516960"/>
-          </a:xfrm>
-          <a:prstGeom prst="rect">
-            <a:avLst/>
-          </a:prstGeom>
-          <a:noFill/>
-          <a:ln>
-            <a:noFill/>
-          </a:ln>
-        </p:spPr>
-        <p:style>
-          <a:lnRef idx="0">
-            <a:scrgbClr r="0" g="0" b="0"/>
-          </a:lnRef>
-          <a:fillRef idx="0">
-            <a:scrgbClr r="0" g="0" b="0"/>
-          </a:fillRef>
-          <a:effectRef idx="0">
-            <a:scrgbClr r="0" g="0" b="0"/>
-          </a:effectRef>
-          <a:fontRef idx="minor"/>
-        </p:style>
-        <p:txBody>
-          <a:bodyPr wrap="none" lIns="90000" tIns="45000" rIns="90000" bIns="45000"/>
-          <a:lstStyle/>
-          <a:p>
-            <a:pPr>
-              <a:lnSpc>
-                <a:spcPct val="100000"/>
-              </a:lnSpc>
-            </a:pPr>
-            <a:r>
-              <a:rPr lang="en-US" sz="2800" b="0" strike="noStrike" spc="-1">
-                <a:solidFill>
-                  <a:srgbClr val="000000"/>
-                </a:solidFill>
-                <a:uFill>
-                  <a:solidFill>
-                    <a:srgbClr val="FFFFFF"/>
-                  </a:solidFill>
-                </a:uFill>
-                <a:latin typeface="Arial"/>
-              </a:rPr>
-              <a:t>…</a:t>
-            </a:r>
-            <a:endParaRPr lang="en-US" sz="1800" b="0" strike="noStrike" spc="-1">
-              <a:solidFill>
-                <a:srgbClr val="000000"/>
-              </a:solidFill>
-              <a:uFill>
-                <a:solidFill>
-                  <a:srgbClr val="FFFFFF"/>
-                </a:solidFill>
-              </a:uFill>
-              <a:latin typeface="Arial"/>
-            </a:endParaRPr>
-          </a:p>
-        </p:txBody>
-      </p:sp>
-      <p:sp>
-        <p:nvSpPr>
-          <p:cNvPr id="163" name="CustomShape 53"/>
-          <p:cNvSpPr/>
-          <p:nvPr/>
-        </p:nvSpPr>
-        <p:spPr>
-          <a:xfrm>
-            <a:off x="5965200" y="4444200"/>
-            <a:ext cx="848880" cy="360"/>
-          </a:xfrm>
-          <a:custGeom>
-            <a:avLst/>
-            <a:gdLst/>
-            <a:ahLst/>
-            <a:cxnLst/>
-            <a:rect l="l" t="t" r="r" b="b"/>
-            <a:pathLst>
-              <a:path w="21600" h="21600">
-                <a:moveTo>
-                  <a:pt x="0" y="0"/>
-                </a:moveTo>
-                <a:lnTo>
-                  <a:pt x="21600" y="21600"/>
-                </a:lnTo>
-              </a:path>
-            </a:pathLst>
-          </a:custGeom>
-          <a:noFill/>
-          <a:ln w="28440">
-            <a:solidFill>
-              <a:srgbClr val="833AA6"/>
-            </a:solidFill>
-            <a:round/>
-            <a:tailEnd type="arrow" w="med" len="med"/>
-          </a:ln>
-        </p:spPr>
-        <p:style>
-          <a:lnRef idx="1">
-            <a:schemeClr val="accent1"/>
-          </a:lnRef>
-          <a:fillRef idx="0">
-            <a:schemeClr val="accent1"/>
-          </a:fillRef>
-          <a:effectRef idx="0">
-            <a:schemeClr val="accent1"/>
-          </a:effectRef>
-          <a:fontRef idx="minor"/>
-        </p:style>
-      </p:sp>
-      <p:sp>
-        <p:nvSpPr>
-          <p:cNvPr id="164" name="CustomShape 54"/>
-          <p:cNvSpPr/>
-          <p:nvPr/>
-        </p:nvSpPr>
-        <p:spPr>
-          <a:xfrm>
-            <a:off x="5965200" y="3513600"/>
-            <a:ext cx="848880" cy="360"/>
-          </a:xfrm>
-          <a:custGeom>
-            <a:avLst/>
-            <a:gdLst/>
-            <a:ahLst/>
-            <a:cxnLst/>
-            <a:rect l="l" t="t" r="r" b="b"/>
-            <a:pathLst>
-              <a:path w="21600" h="21600">
-                <a:moveTo>
-                  <a:pt x="0" y="0"/>
-                </a:moveTo>
-                <a:lnTo>
-                  <a:pt x="21600" y="21600"/>
-                </a:lnTo>
-              </a:path>
-            </a:pathLst>
-          </a:custGeom>
-          <a:noFill/>
-          <a:ln w="28440">
-            <a:solidFill>
-              <a:srgbClr val="833AA6"/>
-            </a:solidFill>
-            <a:round/>
-            <a:tailEnd type="arrow" w="med" len="med"/>
-          </a:ln>
-        </p:spPr>
-        <p:style>
-          <a:lnRef idx="1">
-            <a:schemeClr val="accent1"/>
-          </a:lnRef>
-          <a:fillRef idx="0">
-            <a:schemeClr val="accent1"/>
-          </a:fillRef>
-          <a:effectRef idx="0">
-            <a:schemeClr val="accent1"/>
-          </a:effectRef>
-          <a:fontRef idx="minor"/>
-        </p:style>
-      </p:sp>
-      <p:sp>
-        <p:nvSpPr>
-          <p:cNvPr id="165" name="CustomShape 55"/>
-          <p:cNvSpPr/>
-          <p:nvPr/>
-        </p:nvSpPr>
-        <p:spPr>
-          <a:xfrm>
-            <a:off x="5965200" y="3513600"/>
-            <a:ext cx="848880" cy="280440"/>
-          </a:xfrm>
-          <a:custGeom>
-            <a:avLst/>
-            <a:gdLst/>
-            <a:ahLst/>
-            <a:cxnLst/>
-            <a:rect l="l" t="t" r="r" b="b"/>
-            <a:pathLst>
-              <a:path w="21600" h="21600">
-                <a:moveTo>
-                  <a:pt x="0" y="0"/>
-                </a:moveTo>
-                <a:lnTo>
-                  <a:pt x="21600" y="21600"/>
-                </a:lnTo>
-              </a:path>
-            </a:pathLst>
-          </a:custGeom>
-          <a:noFill/>
-          <a:ln w="28440">
-            <a:solidFill>
-              <a:srgbClr val="833AA6"/>
-            </a:solidFill>
-            <a:round/>
-            <a:tailEnd type="arrow" w="med" len="med"/>
-          </a:ln>
-        </p:spPr>
-        <p:style>
-          <a:lnRef idx="1">
-            <a:schemeClr val="accent1"/>
-          </a:lnRef>
-          <a:fillRef idx="0">
-            <a:schemeClr val="accent1"/>
-          </a:fillRef>
-          <a:effectRef idx="0">
-            <a:schemeClr val="accent1"/>
-          </a:effectRef>
-          <a:fontRef idx="minor"/>
-        </p:style>
-      </p:sp>
-      <p:sp>
-        <p:nvSpPr>
-          <p:cNvPr id="166" name="CustomShape 56"/>
-          <p:cNvSpPr/>
-          <p:nvPr/>
-        </p:nvSpPr>
-        <p:spPr>
-          <a:xfrm flipV="1">
-            <a:off x="5965200" y="3233880"/>
-            <a:ext cx="848880" cy="280440"/>
-          </a:xfrm>
-          <a:custGeom>
-            <a:avLst/>
-            <a:gdLst/>
-            <a:ahLst/>
-            <a:cxnLst/>
-            <a:rect l="l" t="t" r="r" b="b"/>
-            <a:pathLst>
-              <a:path w="21600" h="21600">
-                <a:moveTo>
-                  <a:pt x="0" y="0"/>
-                </a:moveTo>
-                <a:lnTo>
-                  <a:pt x="21600" y="21600"/>
-                </a:lnTo>
-              </a:path>
-            </a:pathLst>
-          </a:custGeom>
-          <a:noFill/>
-          <a:ln w="28440">
-            <a:solidFill>
-              <a:srgbClr val="833AA6"/>
-            </a:solidFill>
-            <a:round/>
-            <a:tailEnd type="arrow" w="med" len="med"/>
-          </a:ln>
-        </p:spPr>
-        <p:style>
-          <a:lnRef idx="1">
-            <a:schemeClr val="accent1"/>
-          </a:lnRef>
-          <a:fillRef idx="0">
-            <a:schemeClr val="accent1"/>
-          </a:fillRef>
-          <a:effectRef idx="0">
-            <a:schemeClr val="accent1"/>
-          </a:effectRef>
-          <a:fontRef idx="minor"/>
-        </p:style>
-      </p:sp>
-      <p:sp>
-        <p:nvSpPr>
-          <p:cNvPr id="167" name="CustomShape 57"/>
-          <p:cNvSpPr/>
-          <p:nvPr/>
-        </p:nvSpPr>
-        <p:spPr>
-          <a:xfrm>
-            <a:off x="5965200" y="4444200"/>
-            <a:ext cx="848880" cy="360"/>
-          </a:xfrm>
-          <a:custGeom>
-            <a:avLst/>
-            <a:gdLst/>
-            <a:ahLst/>
-            <a:cxnLst/>
-            <a:rect l="l" t="t" r="r" b="b"/>
-            <a:pathLst>
-              <a:path w="21600" h="21600">
-                <a:moveTo>
-                  <a:pt x="0" y="0"/>
-                </a:moveTo>
-                <a:lnTo>
-                  <a:pt x="21600" y="21600"/>
-                </a:lnTo>
-              </a:path>
-            </a:pathLst>
-          </a:custGeom>
-          <a:noFill/>
-          <a:ln w="28440">
-            <a:solidFill>
-              <a:srgbClr val="833AA6"/>
-            </a:solidFill>
-            <a:round/>
-            <a:tailEnd type="arrow" w="med" len="med"/>
-          </a:ln>
-        </p:spPr>
-        <p:style>
-          <a:lnRef idx="1">
-            <a:schemeClr val="accent1"/>
-          </a:lnRef>
-          <a:fillRef idx="0">
-            <a:schemeClr val="accent1"/>
-          </a:fillRef>
-          <a:effectRef idx="0">
-            <a:schemeClr val="accent1"/>
-          </a:effectRef>
-          <a:fontRef idx="minor"/>
-        </p:style>
-      </p:sp>
-      <p:sp>
-        <p:nvSpPr>
-          <p:cNvPr id="168" name="CustomShape 58"/>
-          <p:cNvSpPr/>
-          <p:nvPr/>
-        </p:nvSpPr>
-        <p:spPr>
-          <a:xfrm>
-            <a:off x="5965200" y="4444200"/>
-            <a:ext cx="848880" cy="280440"/>
-          </a:xfrm>
-          <a:custGeom>
-            <a:avLst/>
-            <a:gdLst/>
-            <a:ahLst/>
-            <a:cxnLst/>
-            <a:rect l="l" t="t" r="r" b="b"/>
-            <a:pathLst>
-              <a:path w="21600" h="21600">
-                <a:moveTo>
-                  <a:pt x="0" y="0"/>
-                </a:moveTo>
-                <a:lnTo>
-                  <a:pt x="21600" y="21600"/>
-                </a:lnTo>
-              </a:path>
-            </a:pathLst>
-          </a:custGeom>
-          <a:noFill/>
-          <a:ln w="28440">
-            <a:solidFill>
-              <a:srgbClr val="833AA6"/>
-            </a:solidFill>
-            <a:round/>
-            <a:tailEnd type="arrow" w="med" len="med"/>
-          </a:ln>
-        </p:spPr>
-        <p:style>
-          <a:lnRef idx="1">
-            <a:schemeClr val="accent1"/>
-          </a:lnRef>
-          <a:fillRef idx="0">
-            <a:schemeClr val="accent1"/>
-          </a:fillRef>
-          <a:effectRef idx="0">
-            <a:schemeClr val="accent1"/>
-          </a:effectRef>
-          <a:fontRef idx="minor"/>
-        </p:style>
-      </p:sp>
-      <p:sp>
-        <p:nvSpPr>
-          <p:cNvPr id="169" name="CustomShape 59"/>
-          <p:cNvSpPr/>
-          <p:nvPr/>
-        </p:nvSpPr>
-        <p:spPr>
-          <a:xfrm flipV="1">
-            <a:off x="5965200" y="4164480"/>
-            <a:ext cx="848880" cy="280440"/>
-          </a:xfrm>
-          <a:custGeom>
-            <a:avLst/>
-            <a:gdLst/>
-            <a:ahLst/>
-            <a:cxnLst/>
-            <a:rect l="l" t="t" r="r" b="b"/>
-            <a:pathLst>
-              <a:path w="21600" h="21600">
-                <a:moveTo>
-                  <a:pt x="0" y="0"/>
-                </a:moveTo>
-                <a:lnTo>
-                  <a:pt x="21600" y="21600"/>
-                </a:lnTo>
-              </a:path>
-            </a:pathLst>
-          </a:custGeom>
-          <a:noFill/>
-          <a:ln w="28440">
-            <a:solidFill>
-              <a:srgbClr val="833AA6"/>
-            </a:solidFill>
-            <a:round/>
-            <a:tailEnd type="arrow" w="med" len="med"/>
-          </a:ln>
-        </p:spPr>
-        <p:style>
-          <a:lnRef idx="1">
-            <a:schemeClr val="accent1"/>
-          </a:lnRef>
-          <a:fillRef idx="0">
-            <a:schemeClr val="accent1"/>
-          </a:fillRef>
-          <a:effectRef idx="0">
-            <a:schemeClr val="accent1"/>
-          </a:effectRef>
-          <a:fontRef idx="minor"/>
-        </p:style>
-      </p:sp>
-      <p:sp>
-        <p:nvSpPr>
-          <p:cNvPr id="170" name="CustomShape 60"/>
-          <p:cNvSpPr/>
-          <p:nvPr/>
-        </p:nvSpPr>
-        <p:spPr>
-          <a:xfrm>
-            <a:off x="5965200" y="5376240"/>
-            <a:ext cx="848880" cy="360"/>
-          </a:xfrm>
-          <a:custGeom>
-            <a:avLst/>
-            <a:gdLst/>
-            <a:ahLst/>
-            <a:cxnLst/>
-            <a:rect l="l" t="t" r="r" b="b"/>
-            <a:pathLst>
-              <a:path w="21600" h="21600">
-                <a:moveTo>
-                  <a:pt x="0" y="0"/>
-                </a:moveTo>
-                <a:lnTo>
-                  <a:pt x="21600" y="21600"/>
-                </a:lnTo>
-              </a:path>
-            </a:pathLst>
-          </a:custGeom>
-          <a:noFill/>
-          <a:ln w="28440">
-            <a:solidFill>
-              <a:srgbClr val="833AA6"/>
-            </a:solidFill>
-            <a:round/>
-            <a:tailEnd type="arrow" w="med" len="med"/>
-          </a:ln>
-        </p:spPr>
-        <p:style>
-          <a:lnRef idx="1">
-            <a:schemeClr val="accent1"/>
-          </a:lnRef>
-          <a:fillRef idx="0">
-            <a:schemeClr val="accent1"/>
-          </a:fillRef>
-          <a:effectRef idx="0">
-            <a:schemeClr val="accent1"/>
-          </a:effectRef>
-          <a:fontRef idx="minor"/>
-        </p:style>
-      </p:sp>
-      <p:sp>
-        <p:nvSpPr>
-          <p:cNvPr id="171" name="CustomShape 61"/>
-          <p:cNvSpPr/>
-          <p:nvPr/>
-        </p:nvSpPr>
-        <p:spPr>
-          <a:xfrm>
-            <a:off x="5965200" y="5376240"/>
-            <a:ext cx="848880" cy="280440"/>
-          </a:xfrm>
-          <a:custGeom>
-            <a:avLst/>
-            <a:gdLst/>
-            <a:ahLst/>
-            <a:cxnLst/>
-            <a:rect l="l" t="t" r="r" b="b"/>
-            <a:pathLst>
-              <a:path w="21600" h="21600">
-                <a:moveTo>
-                  <a:pt x="0" y="0"/>
-                </a:moveTo>
-                <a:lnTo>
-                  <a:pt x="21600" y="21600"/>
-                </a:lnTo>
-              </a:path>
-            </a:pathLst>
-          </a:custGeom>
-          <a:noFill/>
-          <a:ln w="28440">
-            <a:solidFill>
-              <a:srgbClr val="833AA6"/>
-            </a:solidFill>
-            <a:round/>
-            <a:tailEnd type="arrow" w="med" len="med"/>
-          </a:ln>
-        </p:spPr>
-        <p:style>
-          <a:lnRef idx="1">
-            <a:schemeClr val="accent1"/>
-          </a:lnRef>
-          <a:fillRef idx="0">
-            <a:schemeClr val="accent1"/>
-          </a:fillRef>
-          <a:effectRef idx="0">
-            <a:schemeClr val="accent1"/>
-          </a:effectRef>
-          <a:fontRef idx="minor"/>
-        </p:style>
-      </p:sp>
-      <p:sp>
-        <p:nvSpPr>
-          <p:cNvPr id="172" name="CustomShape 62"/>
-          <p:cNvSpPr/>
-          <p:nvPr/>
-        </p:nvSpPr>
-        <p:spPr>
-          <a:xfrm flipV="1">
-            <a:off x="5965200" y="5096880"/>
-            <a:ext cx="848880" cy="280440"/>
-          </a:xfrm>
-          <a:custGeom>
-            <a:avLst/>
-            <a:gdLst/>
-            <a:ahLst/>
-            <a:cxnLst/>
-            <a:rect l="l" t="t" r="r" b="b"/>
-            <a:pathLst>
-              <a:path w="21600" h="21600">
-                <a:moveTo>
-                  <a:pt x="0" y="0"/>
-                </a:moveTo>
-                <a:lnTo>
-                  <a:pt x="21600" y="21600"/>
-                </a:lnTo>
-              </a:path>
-            </a:pathLst>
-          </a:custGeom>
-          <a:noFill/>
-          <a:ln w="28440">
-            <a:solidFill>
-              <a:srgbClr val="833AA6"/>
-            </a:solidFill>
-            <a:round/>
-            <a:tailEnd type="arrow" w="med" len="med"/>
-          </a:ln>
-        </p:spPr>
-        <p:style>
-          <a:lnRef idx="1">
-            <a:schemeClr val="accent1"/>
-          </a:lnRef>
-          <a:fillRef idx="0">
-            <a:schemeClr val="accent1"/>
-          </a:fillRef>
-          <a:effectRef idx="0">
-            <a:schemeClr val="accent1"/>
-          </a:effectRef>
-          <a:fontRef idx="minor"/>
-        </p:style>
-      </p:sp>
-      <p:sp>
-        <p:nvSpPr>
-          <p:cNvPr id="173" name="CustomShape 63"/>
-          <p:cNvSpPr/>
-          <p:nvPr/>
-        </p:nvSpPr>
-        <p:spPr>
-          <a:xfrm>
-            <a:off x="2301120" y="6074640"/>
-            <a:ext cx="6970680" cy="363600"/>
-          </a:xfrm>
-          <a:prstGeom prst="stripedRightArrow">
-            <a:avLst>
-              <a:gd name="adj1" fmla="val 60810"/>
-              <a:gd name="adj2" fmla="val 66216"/>
-            </a:avLst>
-          </a:prstGeom>
-          <a:gradFill>
-            <a:gsLst>
-              <a:gs pos="0">
-                <a:schemeClr val="tx1"/>
-              </a:gs>
-              <a:gs pos="60000">
-                <a:schemeClr val="bg1">
-                  <a:lumMod val="75000"/>
-                </a:schemeClr>
-              </a:gs>
-              <a:gs pos="89000">
-                <a:schemeClr val="bg1">
-                  <a:lumMod val="85000"/>
-                </a:schemeClr>
-              </a:gs>
-              <a:gs pos="100000">
-                <a:schemeClr val="bg1">
-                  <a:lumMod val="95000"/>
-                </a:schemeClr>
-              </a:gs>
-            </a:gsLst>
-            <a:lin ang="10800000"/>
-          </a:gradFill>
-          <a:ln>
-            <a:noFill/>
-          </a:ln>
-        </p:spPr>
-        <p:style>
-          <a:lnRef idx="2">
-            <a:schemeClr val="accent1">
-              <a:shade val="50000"/>
-            </a:schemeClr>
-          </a:lnRef>
-          <a:fillRef idx="1">
-            <a:schemeClr val="accent1"/>
-          </a:fillRef>
-          <a:effectRef idx="0">
-            <a:schemeClr val="accent1"/>
-          </a:effectRef>
-          <a:fontRef idx="minor"/>
-        </p:style>
-        <p:txBody>
-          <a:bodyPr lIns="90000" tIns="45000" rIns="90000" bIns="45000" anchor="ctr"/>
-          <a:lstStyle/>
-          <a:p>
-            <a:pPr algn="ctr">
-              <a:lnSpc>
-                <a:spcPct val="100000"/>
-              </a:lnSpc>
-            </a:pPr>
-            <a:r>
-              <a:rPr lang="en-US" sz="1800" b="0" strike="noStrike" spc="-1">
-                <a:solidFill>
-                  <a:srgbClr val="FFFFFF"/>
-                </a:solidFill>
-                <a:uFill>
-                  <a:solidFill>
-                    <a:srgbClr val="FFFFFF"/>
-                  </a:solidFill>
-                </a:uFill>
-                <a:latin typeface="Arial"/>
-              </a:rPr>
-              <a:t>Update Function</a:t>
-            </a:r>
-            <a:endParaRPr lang="en-US" sz="1800" b="0" strike="noStrike" spc="-1">
-              <a:solidFill>
-                <a:srgbClr val="000000"/>
-              </a:solidFill>
-              <a:uFill>
-                <a:solidFill>
-                  <a:srgbClr val="FFFFFF"/>
-                </a:solidFill>
-              </a:uFill>
-              <a:latin typeface="Arial"/>
-            </a:endParaRPr>
-          </a:p>
-        </p:txBody>
-      </p:sp>
-      <p:sp>
-        <p:nvSpPr>
-          <p:cNvPr id="174" name="CustomShape 64"/>
-          <p:cNvSpPr/>
-          <p:nvPr/>
-        </p:nvSpPr>
-        <p:spPr>
-          <a:xfrm flipH="1">
-            <a:off x="2262600" y="2305440"/>
-            <a:ext cx="6970680" cy="363600"/>
-          </a:xfrm>
-          <a:prstGeom prst="stripedRightArrow">
-            <a:avLst>
-              <a:gd name="adj1" fmla="val 60810"/>
-              <a:gd name="adj2" fmla="val 66216"/>
-            </a:avLst>
-          </a:prstGeom>
-          <a:gradFill>
-            <a:gsLst>
-              <a:gs pos="0">
-                <a:schemeClr val="tx1"/>
-              </a:gs>
-              <a:gs pos="60000">
-                <a:schemeClr val="bg1">
-                  <a:lumMod val="75000"/>
-                </a:schemeClr>
-              </a:gs>
-              <a:gs pos="89000">
-                <a:schemeClr val="bg1">
-                  <a:lumMod val="85000"/>
-                </a:schemeClr>
-              </a:gs>
-              <a:gs pos="100000">
-                <a:schemeClr val="bg1">
-                  <a:lumMod val="95000"/>
-                </a:schemeClr>
-              </a:gs>
-            </a:gsLst>
-            <a:lin ang="0"/>
-          </a:gradFill>
-          <a:ln>
-            <a:noFill/>
-          </a:ln>
-        </p:spPr>
-        <p:style>
-          <a:lnRef idx="2">
-            <a:schemeClr val="accent1">
-              <a:shade val="50000"/>
-            </a:schemeClr>
-          </a:lnRef>
-          <a:fillRef idx="1">
-            <a:schemeClr val="accent1"/>
-          </a:fillRef>
-          <a:effectRef idx="0">
-            <a:schemeClr val="accent1"/>
-          </a:effectRef>
-          <a:fontRef idx="minor"/>
-        </p:style>
-        <p:txBody>
-          <a:bodyPr lIns="90000" tIns="45000" rIns="90000" bIns="45000" anchor="ctr"/>
-          <a:lstStyle/>
-          <a:p>
-            <a:pPr algn="ctr">
-              <a:lnSpc>
-                <a:spcPct val="100000"/>
-              </a:lnSpc>
-            </a:pPr>
-            <a:r>
-              <a:rPr lang="en-US" sz="1800" b="0" strike="noStrike" spc="-1">
-                <a:solidFill>
-                  <a:srgbClr val="FFFFFF"/>
-                </a:solidFill>
-                <a:uFill>
-                  <a:solidFill>
-                    <a:srgbClr val="FFFFFF"/>
-                  </a:solidFill>
-                </a:uFill>
-                <a:latin typeface="Arial"/>
-              </a:rPr>
-              <a:t>Learning Function</a:t>
-            </a:r>
-            <a:endParaRPr lang="en-US" sz="1800" b="0" strike="noStrike" spc="-1">
-              <a:solidFill>
-                <a:srgbClr val="000000"/>
-              </a:solidFill>
-              <a:uFill>
-                <a:solidFill>
-                  <a:srgbClr val="FFFFFF"/>
-                </a:solidFill>
-              </a:uFill>
-              <a:latin typeface="Arial"/>
-            </a:endParaRPr>
-          </a:p>
-        </p:txBody>
-      </p:sp>
-      <p:sp>
-        <p:nvSpPr>
           <p:cNvPr id="175" name="TextShape 65"/>
           <p:cNvSpPr txBox="1"/>
           <p:nvPr/>
@@ -16624,6 +12838,36 @@
           </p:txBody>
         </p:sp>
       </p:grpSp>
+      <p:pic>
+        <p:nvPicPr>
+          <p:cNvPr id="2" name="Picture 1"/>
+          <p:cNvPicPr>
+            <a:picLocks noChangeAspect="1"/>
+          </p:cNvPicPr>
+          <p:nvPr/>
+        </p:nvPicPr>
+        <p:blipFill>
+          <a:blip r:embed="rId2">
+            <a:extLst>
+              <a:ext uri="{28A0092B-C50C-407E-A947-70E740481C1C}">
+                <a14:useLocalDpi xmlns:a14="http://schemas.microsoft.com/office/drawing/2010/main" val="0"/>
+              </a:ext>
+            </a:extLst>
+          </a:blip>
+          <a:stretch>
+            <a:fillRect/>
+          </a:stretch>
+        </p:blipFill>
+        <p:spPr>
+          <a:xfrm>
+            <a:off x="1067357" y="1523880"/>
+            <a:ext cx="9584523" cy="4733997"/>
+          </a:xfrm>
+          <a:prstGeom prst="rect">
+            <a:avLst/>
+          </a:prstGeom>
+        </p:spPr>
+      </p:pic>
     </p:spTree>
   </p:cSld>
   <p:clrMapOvr>

</xml_diff>

<commit_message>
added note for the presentation view for the data curation slide
</commit_message>
<xml_diff>
--- a/TeX/Presentation/InClassPresentation.pptx
+++ b/TeX/Presentation/InClassPresentation.pptx
@@ -223,7 +223,7 @@
           <a:p>
             <a:fld id="{F10C0CE1-3628-BE43-8C61-1C1605341E86}" type="datetimeFigureOut">
               <a:rPr lang="en-US" smtClean="0"/>
-              <a:t>12/4/17</a:t>
+              <a:t>12/5/17</a:t>
             </a:fld>
             <a:endParaRPr lang="en-US"/>
           </a:p>
@@ -650,6 +650,447 @@
     <p:extLst>
       <p:ext uri="{BB962C8B-B14F-4D97-AF65-F5344CB8AC3E}">
         <p14:creationId xmlns:p14="http://schemas.microsoft.com/office/powerpoint/2010/main" val="68573958"/>
+      </p:ext>
+    </p:extLst>
+  </p:cSld>
+  <p:clrMapOvr>
+    <a:masterClrMapping/>
+  </p:clrMapOvr>
+</p:notes>
+</file>
+
+<file path=ppt/notesSlides/notesSlide3.xml><?xml version="1.0" encoding="utf-8"?>
+<p:notes xmlns:a="http://schemas.openxmlformats.org/drawingml/2006/main" xmlns:r="http://schemas.openxmlformats.org/officeDocument/2006/relationships" xmlns:p="http://schemas.openxmlformats.org/presentationml/2006/main">
+  <p:cSld>
+    <p:spTree>
+      <p:nvGrpSpPr>
+        <p:cNvPr id="1" name=""/>
+        <p:cNvGrpSpPr/>
+        <p:nvPr/>
+      </p:nvGrpSpPr>
+      <p:grpSpPr>
+        <a:xfrm>
+          <a:off x="0" y="0"/>
+          <a:ext cx="0" cy="0"/>
+          <a:chOff x="0" y="0"/>
+          <a:chExt cx="0" cy="0"/>
+        </a:xfrm>
+      </p:grpSpPr>
+      <p:sp>
+        <p:nvSpPr>
+          <p:cNvPr id="2" name="Slide Image Placeholder 1"/>
+          <p:cNvSpPr>
+            <a:spLocks noGrp="1" noRot="1" noChangeAspect="1"/>
+          </p:cNvSpPr>
+          <p:nvPr>
+            <p:ph type="sldImg"/>
+          </p:nvPr>
+        </p:nvSpPr>
+        <p:spPr/>
+      </p:sp>
+      <p:sp>
+        <p:nvSpPr>
+          <p:cNvPr id="3" name="Notes Placeholder 2"/>
+          <p:cNvSpPr>
+            <a:spLocks noGrp="1"/>
+          </p:cNvSpPr>
+          <p:nvPr>
+            <p:ph type="body" idx="1"/>
+          </p:nvPr>
+        </p:nvSpPr>
+        <p:spPr/>
+        <p:txBody>
+          <a:bodyPr/>
+          <a:lstStyle/>
+          <a:p>
+            <a:r>
+              <a:rPr lang="en-US" sz="1200" b="0" strike="noStrike" spc="-1" dirty="0" smtClean="0">
+                <a:solidFill>
+                  <a:srgbClr val="000000"/>
+                </a:solidFill>
+                <a:uFill>
+                  <a:solidFill>
+                    <a:srgbClr val="FFFFFF"/>
+                  </a:solidFill>
+                </a:uFill>
+                <a:latin typeface="Courier New"/>
+              </a:rPr>
+              <a:t>SELECT ?human ?</a:t>
+            </a:r>
+            <a:r>
+              <a:rPr lang="en-US" sz="1200" b="0" strike="noStrike" spc="-1" dirty="0" err="1" smtClean="0">
+                <a:solidFill>
+                  <a:srgbClr val="000000"/>
+                </a:solidFill>
+                <a:uFill>
+                  <a:solidFill>
+                    <a:srgbClr val="FFFFFF"/>
+                  </a:solidFill>
+                </a:uFill>
+                <a:latin typeface="Courier New"/>
+              </a:rPr>
+              <a:t>humanLabel</a:t>
+            </a:r>
+            <a:r>
+              <a:rPr lang="en-US" sz="1200" b="0" strike="noStrike" spc="-1" dirty="0" smtClean="0">
+                <a:solidFill>
+                  <a:srgbClr val="000000"/>
+                </a:solidFill>
+                <a:uFill>
+                  <a:solidFill>
+                    <a:srgbClr val="FFFFFF"/>
+                  </a:solidFill>
+                </a:uFill>
+                <a:latin typeface="Courier New"/>
+              </a:rPr>
+              <a:t> ?spouse ?</a:t>
+            </a:r>
+            <a:r>
+              <a:rPr lang="en-US" sz="1200" b="0" strike="noStrike" spc="-1" dirty="0" err="1" smtClean="0">
+                <a:solidFill>
+                  <a:srgbClr val="000000"/>
+                </a:solidFill>
+                <a:uFill>
+                  <a:solidFill>
+                    <a:srgbClr val="FFFFFF"/>
+                  </a:solidFill>
+                </a:uFill>
+                <a:latin typeface="Courier New"/>
+              </a:rPr>
+              <a:t>spouseLabel</a:t>
+            </a:r>
+            <a:r>
+              <a:rPr lang="en-US" sz="1200" b="0" strike="noStrike" spc="-1" dirty="0" smtClean="0">
+                <a:solidFill>
+                  <a:srgbClr val="000000"/>
+                </a:solidFill>
+                <a:uFill>
+                  <a:solidFill>
+                    <a:srgbClr val="FFFFFF"/>
+                  </a:solidFill>
+                </a:uFill>
+                <a:latin typeface="Courier New"/>
+              </a:rPr>
+              <a:t> WHERE {</a:t>
+            </a:r>
+            <a:endParaRPr lang="en-US" sz="1800" b="1" strike="noStrike" spc="-1" dirty="0" smtClean="0">
+              <a:solidFill>
+                <a:srgbClr val="000000"/>
+              </a:solidFill>
+              <a:uFill>
+                <a:solidFill>
+                  <a:srgbClr val="FFFFFF"/>
+                </a:solidFill>
+              </a:uFill>
+              <a:latin typeface="Arial"/>
+            </a:endParaRPr>
+          </a:p>
+          <a:p>
+            <a:r>
+              <a:rPr lang="en-US" sz="1200" b="0" strike="noStrike" spc="-1" dirty="0" smtClean="0">
+                <a:solidFill>
+                  <a:srgbClr val="000000"/>
+                </a:solidFill>
+                <a:uFill>
+                  <a:solidFill>
+                    <a:srgbClr val="FFFFFF"/>
+                  </a:solidFill>
+                </a:uFill>
+                <a:latin typeface="Courier New"/>
+              </a:rPr>
+              <a:t>?human wdt:P31 wd:Q5.</a:t>
+            </a:r>
+            <a:endParaRPr lang="en-US" sz="1800" b="1" strike="noStrike" spc="-1" dirty="0" smtClean="0">
+              <a:solidFill>
+                <a:srgbClr val="000000"/>
+              </a:solidFill>
+              <a:uFill>
+                <a:solidFill>
+                  <a:srgbClr val="FFFFFF"/>
+                </a:solidFill>
+              </a:uFill>
+              <a:latin typeface="Arial"/>
+            </a:endParaRPr>
+          </a:p>
+          <a:p>
+            <a:r>
+              <a:rPr lang="en-US" sz="1200" b="0" strike="noStrike" spc="-1" dirty="0" smtClean="0">
+                <a:solidFill>
+                  <a:srgbClr val="000000"/>
+                </a:solidFill>
+                <a:uFill>
+                  <a:solidFill>
+                    <a:srgbClr val="FFFFFF"/>
+                  </a:solidFill>
+                </a:uFill>
+                <a:latin typeface="Courier New"/>
+              </a:rPr>
+              <a:t>?human wdt:P26 ?spouse.</a:t>
+            </a:r>
+            <a:endParaRPr lang="en-US" sz="1800" b="1" strike="noStrike" spc="-1" dirty="0" smtClean="0">
+              <a:solidFill>
+                <a:srgbClr val="000000"/>
+              </a:solidFill>
+              <a:uFill>
+                <a:solidFill>
+                  <a:srgbClr val="FFFFFF"/>
+                </a:solidFill>
+              </a:uFill>
+              <a:latin typeface="Arial"/>
+            </a:endParaRPr>
+          </a:p>
+          <a:p>
+            <a:r>
+              <a:rPr lang="en-US" sz="1200" b="0" strike="noStrike" spc="-1" dirty="0" smtClean="0">
+                <a:solidFill>
+                  <a:srgbClr val="000000"/>
+                </a:solidFill>
+                <a:uFill>
+                  <a:solidFill>
+                    <a:srgbClr val="FFFFFF"/>
+                  </a:solidFill>
+                </a:uFill>
+                <a:latin typeface="Courier New"/>
+              </a:rPr>
+              <a:t>  SERVICE </a:t>
+            </a:r>
+            <a:r>
+              <a:rPr lang="en-US" sz="1200" b="0" strike="noStrike" spc="-1" dirty="0" err="1" smtClean="0">
+                <a:solidFill>
+                  <a:srgbClr val="000000"/>
+                </a:solidFill>
+                <a:uFill>
+                  <a:solidFill>
+                    <a:srgbClr val="FFFFFF"/>
+                  </a:solidFill>
+                </a:uFill>
+                <a:latin typeface="Courier New"/>
+              </a:rPr>
+              <a:t>wikibase:label</a:t>
+            </a:r>
+            <a:r>
+              <a:rPr lang="en-US" sz="1200" b="0" strike="noStrike" spc="-1" dirty="0" smtClean="0">
+                <a:solidFill>
+                  <a:srgbClr val="000000"/>
+                </a:solidFill>
+                <a:uFill>
+                  <a:solidFill>
+                    <a:srgbClr val="FFFFFF"/>
+                  </a:solidFill>
+                </a:uFill>
+                <a:latin typeface="Courier New"/>
+              </a:rPr>
+              <a:t> { </a:t>
+            </a:r>
+            <a:r>
+              <a:rPr lang="en-US" sz="1200" b="0" strike="noStrike" spc="-1" dirty="0" err="1" smtClean="0">
+                <a:solidFill>
+                  <a:srgbClr val="000000"/>
+                </a:solidFill>
+                <a:uFill>
+                  <a:solidFill>
+                    <a:srgbClr val="FFFFFF"/>
+                  </a:solidFill>
+                </a:uFill>
+                <a:latin typeface="Courier New"/>
+              </a:rPr>
+              <a:t>bd:serviceParam</a:t>
+            </a:r>
+            <a:r>
+              <a:rPr lang="en-US" sz="1200" b="0" strike="noStrike" spc="-1" dirty="0" smtClean="0">
+                <a:solidFill>
+                  <a:srgbClr val="000000"/>
+                </a:solidFill>
+                <a:uFill>
+                  <a:solidFill>
+                    <a:srgbClr val="FFFFFF"/>
+                  </a:solidFill>
+                </a:uFill>
+                <a:latin typeface="Courier New"/>
+              </a:rPr>
+              <a:t> </a:t>
+            </a:r>
+            <a:r>
+              <a:rPr lang="en-US" sz="1200" b="0" strike="noStrike" spc="-1" dirty="0" err="1" smtClean="0">
+                <a:solidFill>
+                  <a:srgbClr val="000000"/>
+                </a:solidFill>
+                <a:uFill>
+                  <a:solidFill>
+                    <a:srgbClr val="FFFFFF"/>
+                  </a:solidFill>
+                </a:uFill>
+                <a:latin typeface="Courier New"/>
+              </a:rPr>
+              <a:t>wikibase:language</a:t>
+            </a:r>
+            <a:r>
+              <a:rPr lang="en-US" sz="1200" b="0" strike="noStrike" spc="-1" dirty="0" smtClean="0">
+                <a:solidFill>
+                  <a:srgbClr val="000000"/>
+                </a:solidFill>
+                <a:uFill>
+                  <a:solidFill>
+                    <a:srgbClr val="FFFFFF"/>
+                  </a:solidFill>
+                </a:uFill>
+                <a:latin typeface="Courier New"/>
+              </a:rPr>
+              <a:t> "</a:t>
+            </a:r>
+            <a:r>
+              <a:rPr lang="en-US" sz="1200" b="0" strike="noStrike" spc="-1" dirty="0" err="1" smtClean="0">
+                <a:solidFill>
+                  <a:srgbClr val="000000"/>
+                </a:solidFill>
+                <a:uFill>
+                  <a:solidFill>
+                    <a:srgbClr val="FFFFFF"/>
+                  </a:solidFill>
+                </a:uFill>
+                <a:latin typeface="Courier New"/>
+              </a:rPr>
+              <a:t>en</a:t>
+            </a:r>
+            <a:r>
+              <a:rPr lang="en-US" sz="1200" b="0" strike="noStrike" spc="-1" dirty="0" smtClean="0">
+                <a:solidFill>
+                  <a:srgbClr val="000000"/>
+                </a:solidFill>
+                <a:uFill>
+                  <a:solidFill>
+                    <a:srgbClr val="FFFFFF"/>
+                  </a:solidFill>
+                </a:uFill>
+                <a:latin typeface="Courier New"/>
+              </a:rPr>
+              <a:t>". }</a:t>
+            </a:r>
+            <a:endParaRPr lang="en-US" sz="1800" b="1" strike="noStrike" spc="-1" dirty="0" smtClean="0">
+              <a:solidFill>
+                <a:srgbClr val="000000"/>
+              </a:solidFill>
+              <a:uFill>
+                <a:solidFill>
+                  <a:srgbClr val="FFFFFF"/>
+                </a:solidFill>
+              </a:uFill>
+              <a:latin typeface="Arial"/>
+            </a:endParaRPr>
+          </a:p>
+          <a:p>
+            <a:r>
+              <a:rPr lang="en-US" sz="1200" b="0" strike="noStrike" spc="-1" dirty="0" smtClean="0">
+                <a:solidFill>
+                  <a:srgbClr val="000000"/>
+                </a:solidFill>
+                <a:uFill>
+                  <a:solidFill>
+                    <a:srgbClr val="FFFFFF"/>
+                  </a:solidFill>
+                </a:uFill>
+                <a:latin typeface="Courier New"/>
+              </a:rPr>
+              <a:t>  ?human wdt:P40 wd:Q15070044.</a:t>
+            </a:r>
+            <a:endParaRPr lang="en-US" sz="1800" b="1" strike="noStrike" spc="-1" dirty="0" smtClean="0">
+              <a:solidFill>
+                <a:srgbClr val="000000"/>
+              </a:solidFill>
+              <a:uFill>
+                <a:solidFill>
+                  <a:srgbClr val="FFFFFF"/>
+                </a:solidFill>
+              </a:uFill>
+              <a:latin typeface="Arial"/>
+            </a:endParaRPr>
+          </a:p>
+          <a:p>
+            <a:r>
+              <a:rPr lang="en-US" sz="1200" b="0" strike="noStrike" spc="-1" dirty="0" smtClean="0">
+                <a:solidFill>
+                  <a:srgbClr val="000000"/>
+                </a:solidFill>
+                <a:uFill>
+                  <a:solidFill>
+                    <a:srgbClr val="FFFFFF"/>
+                  </a:solidFill>
+                </a:uFill>
+                <a:latin typeface="Courier New"/>
+              </a:rPr>
+              <a:t>}</a:t>
+            </a:r>
+            <a:endParaRPr lang="en-US" sz="1800" b="1" strike="noStrike" spc="-1" dirty="0" smtClean="0">
+              <a:solidFill>
+                <a:srgbClr val="000000"/>
+              </a:solidFill>
+              <a:uFill>
+                <a:solidFill>
+                  <a:srgbClr val="FFFFFF"/>
+                </a:solidFill>
+              </a:uFill>
+              <a:latin typeface="Arial"/>
+            </a:endParaRPr>
+          </a:p>
+          <a:p>
+            <a:r>
+              <a:rPr lang="en-US" sz="1200" b="0" strike="noStrike" spc="-1" dirty="0" smtClean="0">
+                <a:solidFill>
+                  <a:srgbClr val="000000"/>
+                </a:solidFill>
+                <a:uFill>
+                  <a:solidFill>
+                    <a:srgbClr val="FFFFFF"/>
+                  </a:solidFill>
+                </a:uFill>
+                <a:latin typeface="Courier New"/>
+              </a:rPr>
+              <a:t>LIMIT 1</a:t>
+            </a:r>
+            <a:endParaRPr lang="en-US" sz="1800" b="1" strike="noStrike" spc="-1" dirty="0" smtClean="0">
+              <a:solidFill>
+                <a:srgbClr val="000000"/>
+              </a:solidFill>
+              <a:uFill>
+                <a:solidFill>
+                  <a:srgbClr val="FFFFFF"/>
+                </a:solidFill>
+              </a:uFill>
+              <a:latin typeface="Arial"/>
+            </a:endParaRPr>
+          </a:p>
+          <a:p>
+            <a:endParaRPr lang="en-US" dirty="0"/>
+          </a:p>
+        </p:txBody>
+      </p:sp>
+      <p:sp>
+        <p:nvSpPr>
+          <p:cNvPr id="4" name="Slide Number Placeholder 3"/>
+          <p:cNvSpPr>
+            <a:spLocks noGrp="1"/>
+          </p:cNvSpPr>
+          <p:nvPr>
+            <p:ph type="sldNum" sz="quarter" idx="10"/>
+          </p:nvPr>
+        </p:nvSpPr>
+        <p:spPr/>
+        <p:txBody>
+          <a:bodyPr/>
+          <a:lstStyle/>
+          <a:p>
+            <a:fld id="{69A03843-2D8B-FF45-B537-4056479EA609}" type="slidenum">
+              <a:rPr lang="en-US" smtClean="0"/>
+              <a:t>6</a:t>
+            </a:fld>
+            <a:endParaRPr lang="en-US"/>
+          </a:p>
+        </p:txBody>
+      </p:sp>
+    </p:spTree>
+    <p:extLst>
+      <p:ext uri="{BB962C8B-B14F-4D97-AF65-F5344CB8AC3E}">
+        <p14:creationId xmlns:p14="http://schemas.microsoft.com/office/powerpoint/2010/main" val="1105472799"/>
       </p:ext>
     </p:extLst>
   </p:cSld>
@@ -11327,23 +11768,52 @@
             </a:endParaRPr>
           </a:p>
           <a:p>
-            <a:endParaRPr lang="en-US" sz="2000" b="1" strike="noStrike" spc="-1" dirty="0">
-              <a:solidFill>
-                <a:srgbClr val="000000"/>
-              </a:solidFill>
-              <a:uFill>
-                <a:solidFill>
-                  <a:srgbClr val="FFFFFF"/>
-                </a:solidFill>
-              </a:uFill>
-              <a:latin typeface="Arial"/>
-            </a:endParaRPr>
-          </a:p>
-          <a:p>
-            <a:r>
-              <a:rPr lang="en-US" sz="1400" b="0" u="sng" strike="noStrike" spc="-1" dirty="0">
-                <a:solidFill>
-                  <a:srgbClr val="CC9900"/>
+            <a:endParaRPr lang="en-US" sz="2000" b="1" strike="noStrike" spc="-1" dirty="0" smtClean="0">
+              <a:solidFill>
+                <a:srgbClr val="000000"/>
+              </a:solidFill>
+              <a:uFill>
+                <a:solidFill>
+                  <a:srgbClr val="FFFFFF"/>
+                </a:solidFill>
+              </a:uFill>
+              <a:latin typeface="Arial"/>
+              <a:hlinkClick r:id=""/>
+            </a:endParaRPr>
+          </a:p>
+          <a:p>
+            <a:endParaRPr lang="en-US" sz="2000" b="1" spc="-1" dirty="0">
+              <a:solidFill>
+                <a:srgbClr val="000000"/>
+              </a:solidFill>
+              <a:uFill>
+                <a:solidFill>
+                  <a:srgbClr val="FFFFFF"/>
+                </a:solidFill>
+              </a:uFill>
+              <a:latin typeface="Arial"/>
+              <a:hlinkClick r:id=""/>
+            </a:endParaRPr>
+          </a:p>
+          <a:p>
+            <a:endParaRPr lang="en-US" sz="2000" b="1" strike="noStrike" spc="-1" dirty="0" smtClean="0">
+              <a:solidFill>
+                <a:srgbClr val="000000"/>
+              </a:solidFill>
+              <a:uFill>
+                <a:solidFill>
+                  <a:srgbClr val="FFFFFF"/>
+                </a:solidFill>
+              </a:uFill>
+              <a:latin typeface="Arial"/>
+              <a:hlinkClick r:id=""/>
+            </a:endParaRPr>
+          </a:p>
+          <a:p>
+            <a:r>
+              <a:rPr lang="en-US" sz="1600" b="1" strike="noStrike" spc="-1" dirty="0" smtClean="0">
+                <a:solidFill>
+                  <a:srgbClr val="000000"/>
                 </a:solidFill>
                 <a:uFill>
                   <a:solidFill>
@@ -11351,12 +11821,12 @@
                   </a:solidFill>
                 </a:uFill>
                 <a:latin typeface="Arial"/>
-                <a:hlinkClick r:id="rId2"/>
-              </a:rPr>
-              <a:t>https://query.wikidata.org/</a:t>
-            </a:r>
-            <a:r>
-              <a:rPr lang="en-US" sz="1400" b="0" strike="noStrike" spc="-1" dirty="0">
+                <a:hlinkClick r:id="rId3"/>
+              </a:rPr>
+              <a:t>https://query.wikidata.org</a:t>
+            </a:r>
+            <a:r>
+              <a:rPr lang="en-US" sz="1600" b="1" strike="noStrike" spc="-1" smtClean="0">
                 <a:solidFill>
                   <a:srgbClr val="000000"/>
                 </a:solidFill>
@@ -11366,23 +11836,11 @@
                   </a:solidFill>
                 </a:uFill>
                 <a:latin typeface="Arial"/>
-              </a:rPr>
-              <a:t> </a:t>
-            </a:r>
-            <a:endParaRPr lang="en-US" sz="2000" b="1" strike="noStrike" spc="-1" dirty="0">
-              <a:solidFill>
-                <a:srgbClr val="000000"/>
-              </a:solidFill>
-              <a:uFill>
-                <a:solidFill>
-                  <a:srgbClr val="FFFFFF"/>
-                </a:solidFill>
-              </a:uFill>
-              <a:latin typeface="Arial"/>
-            </a:endParaRPr>
-          </a:p>
-          <a:p>
-            <a:endParaRPr lang="en-US" sz="2000" b="1" strike="noStrike" spc="-1" dirty="0">
+                <a:hlinkClick r:id="rId3"/>
+              </a:rPr>
+              <a:t>/</a:t>
+            </a:r>
+            <a:endParaRPr lang="en-US" sz="1600" b="1" strike="noStrike" spc="-1" dirty="0">
               <a:solidFill>
                 <a:srgbClr val="000000"/>
               </a:solidFill>

</xml_diff>